<commit_message>
slides on QC update
Former-commit-id: 4a63ecd0b1e915ce35deb011b12d230504241c84 [formerly 4942461704932b6d2d87e4e8cf01da458824607e]
Former-commit-id: 6aef90c6e3006b2b54f981005d25427331b13c61
</commit_message>
<xml_diff>
--- a/talks/22-01-2021-update.pptx
+++ b/talks/22-01-2021-update.pptx
@@ -2,19 +2,25 @@
 <file path=ppt/presentation.xml><?xml version="1.0" encoding="utf-8"?>
 <p:presentation xmlns:a="http://schemas.openxmlformats.org/drawingml/2006/main" xmlns:r="http://schemas.openxmlformats.org/officeDocument/2006/relationships" xmlns:p="http://schemas.openxmlformats.org/presentationml/2006/main" autoCompressPictures="0">
   <p:sldMasterIdLst>
-    <p:sldMasterId id="2147483856" r:id="rId1"/>
+    <p:sldMasterId id="2147483880" r:id="rId1"/>
   </p:sldMasterIdLst>
   <p:sldIdLst>
     <p:sldId id="256" r:id="rId2"/>
-    <p:sldId id="257" r:id="rId3"/>
+    <p:sldId id="264" r:id="rId3"/>
+    <p:sldId id="263" r:id="rId4"/>
+    <p:sldId id="262" r:id="rId5"/>
+    <p:sldId id="257" r:id="rId6"/>
+    <p:sldId id="258" r:id="rId7"/>
+    <p:sldId id="260" r:id="rId8"/>
+    <p:sldId id="265" r:id="rId9"/>
   </p:sldIdLst>
   <p:sldSz cx="12192000" cy="6858000"/>
   <p:notesSz cx="6858000" cy="9144000"/>
   <p:defaultTextStyle>
     <a:defPPr>
-      <a:defRPr lang="en-NL"/>
+      <a:defRPr lang="en-US"/>
     </a:defPPr>
-    <a:lvl1pPr marL="0" algn="l" defTabSz="914400" rtl="0" eaLnBrk="1" latinLnBrk="0" hangingPunct="1">
+    <a:lvl1pPr marL="0" algn="l" defTabSz="457200" rtl="0" eaLnBrk="1" latinLnBrk="0" hangingPunct="1">
       <a:defRPr sz="1800" kern="1200">
         <a:solidFill>
           <a:schemeClr val="tx1"/>
@@ -24,7 +30,7 @@
         <a:cs typeface="+mn-cs"/>
       </a:defRPr>
     </a:lvl1pPr>
-    <a:lvl2pPr marL="457200" algn="l" defTabSz="914400" rtl="0" eaLnBrk="1" latinLnBrk="0" hangingPunct="1">
+    <a:lvl2pPr marL="457200" algn="l" defTabSz="457200" rtl="0" eaLnBrk="1" latinLnBrk="0" hangingPunct="1">
       <a:defRPr sz="1800" kern="1200">
         <a:solidFill>
           <a:schemeClr val="tx1"/>
@@ -34,7 +40,7 @@
         <a:cs typeface="+mn-cs"/>
       </a:defRPr>
     </a:lvl2pPr>
-    <a:lvl3pPr marL="914400" algn="l" defTabSz="914400" rtl="0" eaLnBrk="1" latinLnBrk="0" hangingPunct="1">
+    <a:lvl3pPr marL="914400" algn="l" defTabSz="457200" rtl="0" eaLnBrk="1" latinLnBrk="0" hangingPunct="1">
       <a:defRPr sz="1800" kern="1200">
         <a:solidFill>
           <a:schemeClr val="tx1"/>
@@ -44,7 +50,7 @@
         <a:cs typeface="+mn-cs"/>
       </a:defRPr>
     </a:lvl3pPr>
-    <a:lvl4pPr marL="1371600" algn="l" defTabSz="914400" rtl="0" eaLnBrk="1" latinLnBrk="0" hangingPunct="1">
+    <a:lvl4pPr marL="1371600" algn="l" defTabSz="457200" rtl="0" eaLnBrk="1" latinLnBrk="0" hangingPunct="1">
       <a:defRPr sz="1800" kern="1200">
         <a:solidFill>
           <a:schemeClr val="tx1"/>
@@ -54,7 +60,7 @@
         <a:cs typeface="+mn-cs"/>
       </a:defRPr>
     </a:lvl4pPr>
-    <a:lvl5pPr marL="1828800" algn="l" defTabSz="914400" rtl="0" eaLnBrk="1" latinLnBrk="0" hangingPunct="1">
+    <a:lvl5pPr marL="1828800" algn="l" defTabSz="457200" rtl="0" eaLnBrk="1" latinLnBrk="0" hangingPunct="1">
       <a:defRPr sz="1800" kern="1200">
         <a:solidFill>
           <a:schemeClr val="tx1"/>
@@ -64,7 +70,7 @@
         <a:cs typeface="+mn-cs"/>
       </a:defRPr>
     </a:lvl5pPr>
-    <a:lvl6pPr marL="2286000" algn="l" defTabSz="914400" rtl="0" eaLnBrk="1" latinLnBrk="0" hangingPunct="1">
+    <a:lvl6pPr marL="2286000" algn="l" defTabSz="457200" rtl="0" eaLnBrk="1" latinLnBrk="0" hangingPunct="1">
       <a:defRPr sz="1800" kern="1200">
         <a:solidFill>
           <a:schemeClr val="tx1"/>
@@ -74,7 +80,7 @@
         <a:cs typeface="+mn-cs"/>
       </a:defRPr>
     </a:lvl6pPr>
-    <a:lvl7pPr marL="2743200" algn="l" defTabSz="914400" rtl="0" eaLnBrk="1" latinLnBrk="0" hangingPunct="1">
+    <a:lvl7pPr marL="2743200" algn="l" defTabSz="457200" rtl="0" eaLnBrk="1" latinLnBrk="0" hangingPunct="1">
       <a:defRPr sz="1800" kern="1200">
         <a:solidFill>
           <a:schemeClr val="tx1"/>
@@ -84,7 +90,7 @@
         <a:cs typeface="+mn-cs"/>
       </a:defRPr>
     </a:lvl7pPr>
-    <a:lvl8pPr marL="3200400" algn="l" defTabSz="914400" rtl="0" eaLnBrk="1" latinLnBrk="0" hangingPunct="1">
+    <a:lvl8pPr marL="3200400" algn="l" defTabSz="457200" rtl="0" eaLnBrk="1" latinLnBrk="0" hangingPunct="1">
       <a:defRPr sz="1800" kern="1200">
         <a:solidFill>
           <a:schemeClr val="tx1"/>
@@ -94,7 +100,7 @@
         <a:cs typeface="+mn-cs"/>
       </a:defRPr>
     </a:lvl8pPr>
-    <a:lvl9pPr marL="3657600" algn="l" defTabSz="914400" rtl="0" eaLnBrk="1" latinLnBrk="0" hangingPunct="1">
+    <a:lvl9pPr marL="3657600" algn="l" defTabSz="457200" rtl="0" eaLnBrk="1" latinLnBrk="0" hangingPunct="1">
       <a:defRPr sz="1800" kern="1200">
         <a:solidFill>
           <a:schemeClr val="tx1"/>
@@ -127,13 +133,7 @@
       </p:grpSpPr>
       <p:sp>
         <p:nvSpPr>
-          <p:cNvPr id="2" name="Title 1">
-            <a:extLst>
-              <a:ext uri="{FF2B5EF4-FFF2-40B4-BE49-F238E27FC236}">
-                <a16:creationId xmlns:a16="http://schemas.microsoft.com/office/drawing/2014/main" id="{4C61A770-E7E4-B642-85A3-627128A29B94}"/>
-              </a:ext>
-            </a:extLst>
-          </p:cNvPr>
+          <p:cNvPr id="2" name="Title 1"/>
           <p:cNvSpPr>
             <a:spLocks noGrp="1"/>
           </p:cNvSpPr>
@@ -159,19 +159,13 @@
               <a:rPr lang="en-GB"/>
               <a:t>Click to edit Master title style</a:t>
             </a:r>
-            <a:endParaRPr lang="en-NL"/>
-          </a:p>
-        </p:txBody>
-      </p:sp>
-      <p:sp>
-        <p:nvSpPr>
-          <p:cNvPr id="3" name="Subtitle 2">
-            <a:extLst>
-              <a:ext uri="{FF2B5EF4-FFF2-40B4-BE49-F238E27FC236}">
-                <a16:creationId xmlns:a16="http://schemas.microsoft.com/office/drawing/2014/main" id="{076E81D8-668A-9D48-90B3-CF15E4A4CF52}"/>
-              </a:ext>
-            </a:extLst>
-          </p:cNvPr>
+            <a:endParaRPr lang="en-US" dirty="0"/>
+          </a:p>
+        </p:txBody>
+      </p:sp>
+      <p:sp>
+        <p:nvSpPr>
+          <p:cNvPr id="3" name="Subtitle 2"/>
           <p:cNvSpPr>
             <a:spLocks noGrp="1"/>
           </p:cNvSpPr>
@@ -230,19 +224,13 @@
               <a:rPr lang="en-GB"/>
               <a:t>Click to edit Master subtitle style</a:t>
             </a:r>
-            <a:endParaRPr lang="en-NL"/>
-          </a:p>
-        </p:txBody>
-      </p:sp>
-      <p:sp>
-        <p:nvSpPr>
-          <p:cNvPr id="4" name="Date Placeholder 3">
-            <a:extLst>
-              <a:ext uri="{FF2B5EF4-FFF2-40B4-BE49-F238E27FC236}">
-                <a16:creationId xmlns:a16="http://schemas.microsoft.com/office/drawing/2014/main" id="{D4FB4273-8F9E-B44E-B929-2FC97F8BB267}"/>
-              </a:ext>
-            </a:extLst>
-          </p:cNvPr>
+            <a:endParaRPr lang="en-US" dirty="0"/>
+          </a:p>
+        </p:txBody>
+      </p:sp>
+      <p:sp>
+        <p:nvSpPr>
+          <p:cNvPr id="4" name="Date Placeholder 3"/>
           <p:cNvSpPr>
             <a:spLocks noGrp="1"/>
           </p:cNvSpPr>
@@ -265,13 +253,7 @@
       </p:sp>
       <p:sp>
         <p:nvSpPr>
-          <p:cNvPr id="5" name="Footer Placeholder 4">
-            <a:extLst>
-              <a:ext uri="{FF2B5EF4-FFF2-40B4-BE49-F238E27FC236}">
-                <a16:creationId xmlns:a16="http://schemas.microsoft.com/office/drawing/2014/main" id="{2976FD43-984F-A54A-B09C-322D238437D4}"/>
-              </a:ext>
-            </a:extLst>
-          </p:cNvPr>
+          <p:cNvPr id="5" name="Footer Placeholder 4"/>
           <p:cNvSpPr>
             <a:spLocks noGrp="1"/>
           </p:cNvSpPr>
@@ -290,13 +272,7 @@
       </p:sp>
       <p:sp>
         <p:nvSpPr>
-          <p:cNvPr id="6" name="Slide Number Placeholder 5">
-            <a:extLst>
-              <a:ext uri="{FF2B5EF4-FFF2-40B4-BE49-F238E27FC236}">
-                <a16:creationId xmlns:a16="http://schemas.microsoft.com/office/drawing/2014/main" id="{D0659F1A-2917-0146-B841-E95636F4C6F4}"/>
-              </a:ext>
-            </a:extLst>
-          </p:cNvPr>
+          <p:cNvPr id="6" name="Slide Number Placeholder 5"/>
           <p:cNvSpPr>
             <a:spLocks noGrp="1"/>
           </p:cNvSpPr>
@@ -320,7 +296,7 @@
     </p:spTree>
     <p:extLst>
       <p:ext uri="{BB962C8B-B14F-4D97-AF65-F5344CB8AC3E}">
-        <p14:creationId xmlns:p14="http://schemas.microsoft.com/office/powerpoint/2010/main" val="1821988158"/>
+        <p14:creationId xmlns:p14="http://schemas.microsoft.com/office/powerpoint/2010/main" val="3262165252"/>
       </p:ext>
     </p:extLst>
   </p:cSld>
@@ -349,13 +325,7 @@
       </p:grpSpPr>
       <p:sp>
         <p:nvSpPr>
-          <p:cNvPr id="2" name="Title 1">
-            <a:extLst>
-              <a:ext uri="{FF2B5EF4-FFF2-40B4-BE49-F238E27FC236}">
-                <a16:creationId xmlns:a16="http://schemas.microsoft.com/office/drawing/2014/main" id="{CB1DD0F2-211F-6C45-A0E2-AA64FA730070}"/>
-              </a:ext>
-            </a:extLst>
-          </p:cNvPr>
+          <p:cNvPr id="2" name="Title 1"/>
           <p:cNvSpPr>
             <a:spLocks noGrp="1"/>
           </p:cNvSpPr>
@@ -372,19 +342,13 @@
               <a:rPr lang="en-GB"/>
               <a:t>Click to edit Master title style</a:t>
             </a:r>
-            <a:endParaRPr lang="en-NL"/>
-          </a:p>
-        </p:txBody>
-      </p:sp>
-      <p:sp>
-        <p:nvSpPr>
-          <p:cNvPr id="3" name="Vertical Text Placeholder 2">
-            <a:extLst>
-              <a:ext uri="{FF2B5EF4-FFF2-40B4-BE49-F238E27FC236}">
-                <a16:creationId xmlns:a16="http://schemas.microsoft.com/office/drawing/2014/main" id="{9950963B-6CC7-3C4A-A702-F2C0E6F32FD4}"/>
-              </a:ext>
-            </a:extLst>
-          </p:cNvPr>
+            <a:endParaRPr lang="en-US" dirty="0"/>
+          </a:p>
+        </p:txBody>
+      </p:sp>
+      <p:sp>
+        <p:nvSpPr>
+          <p:cNvPr id="3" name="Vertical Text Placeholder 2"/>
           <p:cNvSpPr>
             <a:spLocks noGrp="1"/>
           </p:cNvSpPr>
@@ -430,19 +394,13 @@
               <a:rPr lang="en-GB"/>
               <a:t>Fifth level</a:t>
             </a:r>
-            <a:endParaRPr lang="en-NL"/>
-          </a:p>
-        </p:txBody>
-      </p:sp>
-      <p:sp>
-        <p:nvSpPr>
-          <p:cNvPr id="4" name="Date Placeholder 3">
-            <a:extLst>
-              <a:ext uri="{FF2B5EF4-FFF2-40B4-BE49-F238E27FC236}">
-                <a16:creationId xmlns:a16="http://schemas.microsoft.com/office/drawing/2014/main" id="{F29282C3-839C-3545-9DD4-4C925CD97790}"/>
-              </a:ext>
-            </a:extLst>
-          </p:cNvPr>
+            <a:endParaRPr lang="en-US" dirty="0"/>
+          </a:p>
+        </p:txBody>
+      </p:sp>
+      <p:sp>
+        <p:nvSpPr>
+          <p:cNvPr id="4" name="Date Placeholder 3"/>
           <p:cNvSpPr>
             <a:spLocks noGrp="1"/>
           </p:cNvSpPr>
@@ -466,13 +424,7 @@
       </p:sp>
       <p:sp>
         <p:nvSpPr>
-          <p:cNvPr id="5" name="Footer Placeholder 4">
-            <a:extLst>
-              <a:ext uri="{FF2B5EF4-FFF2-40B4-BE49-F238E27FC236}">
-                <a16:creationId xmlns:a16="http://schemas.microsoft.com/office/drawing/2014/main" id="{479ADD89-7F68-654C-A463-CE5F352E7687}"/>
-              </a:ext>
-            </a:extLst>
-          </p:cNvPr>
+          <p:cNvPr id="5" name="Footer Placeholder 4"/>
           <p:cNvSpPr>
             <a:spLocks noGrp="1"/>
           </p:cNvSpPr>
@@ -491,13 +443,7 @@
       </p:sp>
       <p:sp>
         <p:nvSpPr>
-          <p:cNvPr id="6" name="Slide Number Placeholder 5">
-            <a:extLst>
-              <a:ext uri="{FF2B5EF4-FFF2-40B4-BE49-F238E27FC236}">
-                <a16:creationId xmlns:a16="http://schemas.microsoft.com/office/drawing/2014/main" id="{E0092D9A-133E-0647-A70C-F512ADC19103}"/>
-              </a:ext>
-            </a:extLst>
-          </p:cNvPr>
+          <p:cNvPr id="6" name="Slide Number Placeholder 5"/>
           <p:cNvSpPr>
             <a:spLocks noGrp="1"/>
           </p:cNvSpPr>
@@ -522,7 +468,7 @@
     </p:spTree>
     <p:extLst>
       <p:ext uri="{BB962C8B-B14F-4D97-AF65-F5344CB8AC3E}">
-        <p14:creationId xmlns:p14="http://schemas.microsoft.com/office/powerpoint/2010/main" val="2423336912"/>
+        <p14:creationId xmlns:p14="http://schemas.microsoft.com/office/powerpoint/2010/main" val="95716890"/>
       </p:ext>
     </p:extLst>
   </p:cSld>
@@ -551,13 +497,7 @@
       </p:grpSpPr>
       <p:sp>
         <p:nvSpPr>
-          <p:cNvPr id="2" name="Vertical Title 1">
-            <a:extLst>
-              <a:ext uri="{FF2B5EF4-FFF2-40B4-BE49-F238E27FC236}">
-                <a16:creationId xmlns:a16="http://schemas.microsoft.com/office/drawing/2014/main" id="{A3F6A77B-3882-F349-BBD2-E02E13E7647A}"/>
-              </a:ext>
-            </a:extLst>
-          </p:cNvPr>
+          <p:cNvPr id="2" name="Vertical Title 1"/>
           <p:cNvSpPr>
             <a:spLocks noGrp="1"/>
           </p:cNvSpPr>
@@ -579,19 +519,13 @@
               <a:rPr lang="en-GB"/>
               <a:t>Click to edit Master title style</a:t>
             </a:r>
-            <a:endParaRPr lang="en-NL"/>
-          </a:p>
-        </p:txBody>
-      </p:sp>
-      <p:sp>
-        <p:nvSpPr>
-          <p:cNvPr id="3" name="Vertical Text Placeholder 2">
-            <a:extLst>
-              <a:ext uri="{FF2B5EF4-FFF2-40B4-BE49-F238E27FC236}">
-                <a16:creationId xmlns:a16="http://schemas.microsoft.com/office/drawing/2014/main" id="{210BC0C8-D446-AC45-A2CA-FC8EA8558B5C}"/>
-              </a:ext>
-            </a:extLst>
-          </p:cNvPr>
+            <a:endParaRPr lang="en-US" dirty="0"/>
+          </a:p>
+        </p:txBody>
+      </p:sp>
+      <p:sp>
+        <p:nvSpPr>
+          <p:cNvPr id="3" name="Vertical Text Placeholder 2"/>
           <p:cNvSpPr>
             <a:spLocks noGrp="1"/>
           </p:cNvSpPr>
@@ -642,19 +576,13 @@
               <a:rPr lang="en-GB"/>
               <a:t>Fifth level</a:t>
             </a:r>
-            <a:endParaRPr lang="en-NL"/>
-          </a:p>
-        </p:txBody>
-      </p:sp>
-      <p:sp>
-        <p:nvSpPr>
-          <p:cNvPr id="4" name="Date Placeholder 3">
-            <a:extLst>
-              <a:ext uri="{FF2B5EF4-FFF2-40B4-BE49-F238E27FC236}">
-                <a16:creationId xmlns:a16="http://schemas.microsoft.com/office/drawing/2014/main" id="{C61E04C7-520E-474C-81E2-292486EE9381}"/>
-              </a:ext>
-            </a:extLst>
-          </p:cNvPr>
+            <a:endParaRPr lang="en-US" dirty="0"/>
+          </a:p>
+        </p:txBody>
+      </p:sp>
+      <p:sp>
+        <p:nvSpPr>
+          <p:cNvPr id="4" name="Date Placeholder 3"/>
           <p:cNvSpPr>
             <a:spLocks noGrp="1"/>
           </p:cNvSpPr>
@@ -678,13 +606,7 @@
       </p:sp>
       <p:sp>
         <p:nvSpPr>
-          <p:cNvPr id="5" name="Footer Placeholder 4">
-            <a:extLst>
-              <a:ext uri="{FF2B5EF4-FFF2-40B4-BE49-F238E27FC236}">
-                <a16:creationId xmlns:a16="http://schemas.microsoft.com/office/drawing/2014/main" id="{01E27C1B-DB33-F74B-B6AA-50E7262CB34F}"/>
-              </a:ext>
-            </a:extLst>
-          </p:cNvPr>
+          <p:cNvPr id="5" name="Footer Placeholder 4"/>
           <p:cNvSpPr>
             <a:spLocks noGrp="1"/>
           </p:cNvSpPr>
@@ -703,13 +625,7 @@
       </p:sp>
       <p:sp>
         <p:nvSpPr>
-          <p:cNvPr id="6" name="Slide Number Placeholder 5">
-            <a:extLst>
-              <a:ext uri="{FF2B5EF4-FFF2-40B4-BE49-F238E27FC236}">
-                <a16:creationId xmlns:a16="http://schemas.microsoft.com/office/drawing/2014/main" id="{EFD68DD6-F758-8746-8672-05648F709BB0}"/>
-              </a:ext>
-            </a:extLst>
-          </p:cNvPr>
+          <p:cNvPr id="6" name="Slide Number Placeholder 5"/>
           <p:cNvSpPr>
             <a:spLocks noGrp="1"/>
           </p:cNvSpPr>
@@ -734,7 +650,7 @@
     </p:spTree>
     <p:extLst>
       <p:ext uri="{BB962C8B-B14F-4D97-AF65-F5344CB8AC3E}">
-        <p14:creationId xmlns:p14="http://schemas.microsoft.com/office/powerpoint/2010/main" val="2863317357"/>
+        <p14:creationId xmlns:p14="http://schemas.microsoft.com/office/powerpoint/2010/main" val="342448417"/>
       </p:ext>
     </p:extLst>
   </p:cSld>
@@ -763,13 +679,7 @@
       </p:grpSpPr>
       <p:sp>
         <p:nvSpPr>
-          <p:cNvPr id="2" name="Title 1">
-            <a:extLst>
-              <a:ext uri="{FF2B5EF4-FFF2-40B4-BE49-F238E27FC236}">
-                <a16:creationId xmlns:a16="http://schemas.microsoft.com/office/drawing/2014/main" id="{FD1A0E14-4CFE-4D48-AEC3-C77F9C8AA061}"/>
-              </a:ext>
-            </a:extLst>
-          </p:cNvPr>
+          <p:cNvPr id="2" name="Title 1"/>
           <p:cNvSpPr>
             <a:spLocks noGrp="1"/>
           </p:cNvSpPr>
@@ -786,19 +696,13 @@
               <a:rPr lang="en-GB"/>
               <a:t>Click to edit Master title style</a:t>
             </a:r>
-            <a:endParaRPr lang="en-NL"/>
-          </a:p>
-        </p:txBody>
-      </p:sp>
-      <p:sp>
-        <p:nvSpPr>
-          <p:cNvPr id="3" name="Content Placeholder 2">
-            <a:extLst>
-              <a:ext uri="{FF2B5EF4-FFF2-40B4-BE49-F238E27FC236}">
-                <a16:creationId xmlns:a16="http://schemas.microsoft.com/office/drawing/2014/main" id="{CCED4679-02CC-EA4A-8592-BF4E8E0D7402}"/>
-              </a:ext>
-            </a:extLst>
-          </p:cNvPr>
+            <a:endParaRPr lang="en-US" dirty="0"/>
+          </a:p>
+        </p:txBody>
+      </p:sp>
+      <p:sp>
+        <p:nvSpPr>
+          <p:cNvPr id="3" name="Content Placeholder 2"/>
           <p:cNvSpPr>
             <a:spLocks noGrp="1"/>
           </p:cNvSpPr>
@@ -844,19 +748,13 @@
               <a:rPr lang="en-GB"/>
               <a:t>Fifth level</a:t>
             </a:r>
-            <a:endParaRPr lang="en-NL"/>
-          </a:p>
-        </p:txBody>
-      </p:sp>
-      <p:sp>
-        <p:nvSpPr>
-          <p:cNvPr id="4" name="Date Placeholder 3">
-            <a:extLst>
-              <a:ext uri="{FF2B5EF4-FFF2-40B4-BE49-F238E27FC236}">
-                <a16:creationId xmlns:a16="http://schemas.microsoft.com/office/drawing/2014/main" id="{A83AC9F9-326A-B44C-BC63-4D89C78A17AF}"/>
-              </a:ext>
-            </a:extLst>
-          </p:cNvPr>
+            <a:endParaRPr lang="en-US" dirty="0"/>
+          </a:p>
+        </p:txBody>
+      </p:sp>
+      <p:sp>
+        <p:nvSpPr>
+          <p:cNvPr id="4" name="Date Placeholder 3"/>
           <p:cNvSpPr>
             <a:spLocks noGrp="1"/>
           </p:cNvSpPr>
@@ -880,13 +778,7 @@
       </p:sp>
       <p:sp>
         <p:nvSpPr>
-          <p:cNvPr id="5" name="Footer Placeholder 4">
-            <a:extLst>
-              <a:ext uri="{FF2B5EF4-FFF2-40B4-BE49-F238E27FC236}">
-                <a16:creationId xmlns:a16="http://schemas.microsoft.com/office/drawing/2014/main" id="{B16DB63B-7059-BD4A-8B3A-06426992BB34}"/>
-              </a:ext>
-            </a:extLst>
-          </p:cNvPr>
+          <p:cNvPr id="5" name="Footer Placeholder 4"/>
           <p:cNvSpPr>
             <a:spLocks noGrp="1"/>
           </p:cNvSpPr>
@@ -905,13 +797,7 @@
       </p:sp>
       <p:sp>
         <p:nvSpPr>
-          <p:cNvPr id="6" name="Slide Number Placeholder 5">
-            <a:extLst>
-              <a:ext uri="{FF2B5EF4-FFF2-40B4-BE49-F238E27FC236}">
-                <a16:creationId xmlns:a16="http://schemas.microsoft.com/office/drawing/2014/main" id="{9B725CDD-7918-7346-9847-5F9CB2F9DFDC}"/>
-              </a:ext>
-            </a:extLst>
-          </p:cNvPr>
+          <p:cNvPr id="6" name="Slide Number Placeholder 5"/>
           <p:cNvSpPr>
             <a:spLocks noGrp="1"/>
           </p:cNvSpPr>
@@ -936,7 +822,7 @@
     </p:spTree>
     <p:extLst>
       <p:ext uri="{BB962C8B-B14F-4D97-AF65-F5344CB8AC3E}">
-        <p14:creationId xmlns:p14="http://schemas.microsoft.com/office/powerpoint/2010/main" val="3874266670"/>
+        <p14:creationId xmlns:p14="http://schemas.microsoft.com/office/powerpoint/2010/main" val="3424323294"/>
       </p:ext>
     </p:extLst>
   </p:cSld>
@@ -965,13 +851,7 @@
       </p:grpSpPr>
       <p:sp>
         <p:nvSpPr>
-          <p:cNvPr id="2" name="Title 1">
-            <a:extLst>
-              <a:ext uri="{FF2B5EF4-FFF2-40B4-BE49-F238E27FC236}">
-                <a16:creationId xmlns:a16="http://schemas.microsoft.com/office/drawing/2014/main" id="{07F3271B-B119-5B43-98CB-516B5A3CF8AA}"/>
-              </a:ext>
-            </a:extLst>
-          </p:cNvPr>
+          <p:cNvPr id="2" name="Title 1"/>
           <p:cNvSpPr>
             <a:spLocks noGrp="1"/>
           </p:cNvSpPr>
@@ -997,19 +877,13 @@
               <a:rPr lang="en-GB"/>
               <a:t>Click to edit Master title style</a:t>
             </a:r>
-            <a:endParaRPr lang="en-NL"/>
-          </a:p>
-        </p:txBody>
-      </p:sp>
-      <p:sp>
-        <p:nvSpPr>
-          <p:cNvPr id="3" name="Text Placeholder 2">
-            <a:extLst>
-              <a:ext uri="{FF2B5EF4-FFF2-40B4-BE49-F238E27FC236}">
-                <a16:creationId xmlns:a16="http://schemas.microsoft.com/office/drawing/2014/main" id="{E2D66F14-3ED7-574E-9971-F2FFC63D05C4}"/>
-              </a:ext>
-            </a:extLst>
-          </p:cNvPr>
+            <a:endParaRPr lang="en-US" dirty="0"/>
+          </a:p>
+        </p:txBody>
+      </p:sp>
+      <p:sp>
+        <p:nvSpPr>
+          <p:cNvPr id="3" name="Text Placeholder 2"/>
           <p:cNvSpPr>
             <a:spLocks noGrp="1"/>
           </p:cNvSpPr>
@@ -1128,13 +1002,7 @@
       </p:sp>
       <p:sp>
         <p:nvSpPr>
-          <p:cNvPr id="4" name="Date Placeholder 3">
-            <a:extLst>
-              <a:ext uri="{FF2B5EF4-FFF2-40B4-BE49-F238E27FC236}">
-                <a16:creationId xmlns:a16="http://schemas.microsoft.com/office/drawing/2014/main" id="{07DEDBE8-272C-8D45-8B00-6970F3A9E906}"/>
-              </a:ext>
-            </a:extLst>
-          </p:cNvPr>
+          <p:cNvPr id="4" name="Date Placeholder 3"/>
           <p:cNvSpPr>
             <a:spLocks noGrp="1"/>
           </p:cNvSpPr>
@@ -1157,13 +1025,7 @@
       </p:sp>
       <p:sp>
         <p:nvSpPr>
-          <p:cNvPr id="5" name="Footer Placeholder 4">
-            <a:extLst>
-              <a:ext uri="{FF2B5EF4-FFF2-40B4-BE49-F238E27FC236}">
-                <a16:creationId xmlns:a16="http://schemas.microsoft.com/office/drawing/2014/main" id="{CC4DE7A4-8654-CB4F-ADF2-2F17505D0EEA}"/>
-              </a:ext>
-            </a:extLst>
-          </p:cNvPr>
+          <p:cNvPr id="5" name="Footer Placeholder 4"/>
           <p:cNvSpPr>
             <a:spLocks noGrp="1"/>
           </p:cNvSpPr>
@@ -1182,13 +1044,7 @@
       </p:sp>
       <p:sp>
         <p:nvSpPr>
-          <p:cNvPr id="6" name="Slide Number Placeholder 5">
-            <a:extLst>
-              <a:ext uri="{FF2B5EF4-FFF2-40B4-BE49-F238E27FC236}">
-                <a16:creationId xmlns:a16="http://schemas.microsoft.com/office/drawing/2014/main" id="{08E5FB59-8FBF-2B48-AC5E-CF40620285AC}"/>
-              </a:ext>
-            </a:extLst>
-          </p:cNvPr>
+          <p:cNvPr id="6" name="Slide Number Placeholder 5"/>
           <p:cNvSpPr>
             <a:spLocks noGrp="1"/>
           </p:cNvSpPr>
@@ -1212,7 +1068,7 @@
     </p:spTree>
     <p:extLst>
       <p:ext uri="{BB962C8B-B14F-4D97-AF65-F5344CB8AC3E}">
-        <p14:creationId xmlns:p14="http://schemas.microsoft.com/office/powerpoint/2010/main" val="2479691149"/>
+        <p14:creationId xmlns:p14="http://schemas.microsoft.com/office/powerpoint/2010/main" val="2075992313"/>
       </p:ext>
     </p:extLst>
   </p:cSld>
@@ -1241,13 +1097,7 @@
       </p:grpSpPr>
       <p:sp>
         <p:nvSpPr>
-          <p:cNvPr id="2" name="Title 1">
-            <a:extLst>
-              <a:ext uri="{FF2B5EF4-FFF2-40B4-BE49-F238E27FC236}">
-                <a16:creationId xmlns:a16="http://schemas.microsoft.com/office/drawing/2014/main" id="{F50A6D0D-B0A4-324D-B581-53A4EE3DEF79}"/>
-              </a:ext>
-            </a:extLst>
-          </p:cNvPr>
+          <p:cNvPr id="2" name="Title 1"/>
           <p:cNvSpPr>
             <a:spLocks noGrp="1"/>
           </p:cNvSpPr>
@@ -1264,19 +1114,13 @@
               <a:rPr lang="en-GB"/>
               <a:t>Click to edit Master title style</a:t>
             </a:r>
-            <a:endParaRPr lang="en-NL"/>
-          </a:p>
-        </p:txBody>
-      </p:sp>
-      <p:sp>
-        <p:nvSpPr>
-          <p:cNvPr id="3" name="Content Placeholder 2">
-            <a:extLst>
-              <a:ext uri="{FF2B5EF4-FFF2-40B4-BE49-F238E27FC236}">
-                <a16:creationId xmlns:a16="http://schemas.microsoft.com/office/drawing/2014/main" id="{23D5F70D-B35D-2846-AF21-8804E2FAAB37}"/>
-              </a:ext>
-            </a:extLst>
-          </p:cNvPr>
+            <a:endParaRPr lang="en-US" dirty="0"/>
+          </a:p>
+        </p:txBody>
+      </p:sp>
+      <p:sp>
+        <p:nvSpPr>
+          <p:cNvPr id="3" name="Content Placeholder 2"/>
           <p:cNvSpPr>
             <a:spLocks noGrp="1"/>
           </p:cNvSpPr>
@@ -1327,19 +1171,13 @@
               <a:rPr lang="en-GB"/>
               <a:t>Fifth level</a:t>
             </a:r>
-            <a:endParaRPr lang="en-NL"/>
-          </a:p>
-        </p:txBody>
-      </p:sp>
-      <p:sp>
-        <p:nvSpPr>
-          <p:cNvPr id="4" name="Content Placeholder 3">
-            <a:extLst>
-              <a:ext uri="{FF2B5EF4-FFF2-40B4-BE49-F238E27FC236}">
-                <a16:creationId xmlns:a16="http://schemas.microsoft.com/office/drawing/2014/main" id="{4ECA29B0-50A8-0B46-895A-70F9E31BAA25}"/>
-              </a:ext>
-            </a:extLst>
-          </p:cNvPr>
+            <a:endParaRPr lang="en-US" dirty="0"/>
+          </a:p>
+        </p:txBody>
+      </p:sp>
+      <p:sp>
+        <p:nvSpPr>
+          <p:cNvPr id="4" name="Content Placeholder 3"/>
           <p:cNvSpPr>
             <a:spLocks noGrp="1"/>
           </p:cNvSpPr>
@@ -1390,19 +1228,13 @@
               <a:rPr lang="en-GB"/>
               <a:t>Fifth level</a:t>
             </a:r>
-            <a:endParaRPr lang="en-NL"/>
-          </a:p>
-        </p:txBody>
-      </p:sp>
-      <p:sp>
-        <p:nvSpPr>
-          <p:cNvPr id="5" name="Date Placeholder 4">
-            <a:extLst>
-              <a:ext uri="{FF2B5EF4-FFF2-40B4-BE49-F238E27FC236}">
-                <a16:creationId xmlns:a16="http://schemas.microsoft.com/office/drawing/2014/main" id="{C656942A-A71D-7645-9671-3D957B7D1097}"/>
-              </a:ext>
-            </a:extLst>
-          </p:cNvPr>
+            <a:endParaRPr lang="en-US" dirty="0"/>
+          </a:p>
+        </p:txBody>
+      </p:sp>
+      <p:sp>
+        <p:nvSpPr>
+          <p:cNvPr id="5" name="Date Placeholder 4"/>
           <p:cNvSpPr>
             <a:spLocks noGrp="1"/>
           </p:cNvSpPr>
@@ -1426,13 +1258,7 @@
       </p:sp>
       <p:sp>
         <p:nvSpPr>
-          <p:cNvPr id="6" name="Footer Placeholder 5">
-            <a:extLst>
-              <a:ext uri="{FF2B5EF4-FFF2-40B4-BE49-F238E27FC236}">
-                <a16:creationId xmlns:a16="http://schemas.microsoft.com/office/drawing/2014/main" id="{93DDA08A-CFC9-B14D-8B58-2D01C8B102EE}"/>
-              </a:ext>
-            </a:extLst>
-          </p:cNvPr>
+          <p:cNvPr id="6" name="Footer Placeholder 5"/>
           <p:cNvSpPr>
             <a:spLocks noGrp="1"/>
           </p:cNvSpPr>
@@ -1451,13 +1277,7 @@
       </p:sp>
       <p:sp>
         <p:nvSpPr>
-          <p:cNvPr id="7" name="Slide Number Placeholder 6">
-            <a:extLst>
-              <a:ext uri="{FF2B5EF4-FFF2-40B4-BE49-F238E27FC236}">
-                <a16:creationId xmlns:a16="http://schemas.microsoft.com/office/drawing/2014/main" id="{FF5E9CD9-DCC3-7942-B1A1-7634B49E19C3}"/>
-              </a:ext>
-            </a:extLst>
-          </p:cNvPr>
+          <p:cNvPr id="7" name="Slide Number Placeholder 6"/>
           <p:cNvSpPr>
             <a:spLocks noGrp="1"/>
           </p:cNvSpPr>
@@ -1482,7 +1302,7 @@
     </p:spTree>
     <p:extLst>
       <p:ext uri="{BB962C8B-B14F-4D97-AF65-F5344CB8AC3E}">
-        <p14:creationId xmlns:p14="http://schemas.microsoft.com/office/powerpoint/2010/main" val="783305226"/>
+        <p14:creationId xmlns:p14="http://schemas.microsoft.com/office/powerpoint/2010/main" val="4141705378"/>
       </p:ext>
     </p:extLst>
   </p:cSld>
@@ -1511,13 +1331,7 @@
       </p:grpSpPr>
       <p:sp>
         <p:nvSpPr>
-          <p:cNvPr id="2" name="Title 1">
-            <a:extLst>
-              <a:ext uri="{FF2B5EF4-FFF2-40B4-BE49-F238E27FC236}">
-                <a16:creationId xmlns:a16="http://schemas.microsoft.com/office/drawing/2014/main" id="{030C7A74-561D-1445-9277-72F7EDCF318F}"/>
-              </a:ext>
-            </a:extLst>
-          </p:cNvPr>
+          <p:cNvPr id="2" name="Title 1"/>
           <p:cNvSpPr>
             <a:spLocks noGrp="1"/>
           </p:cNvSpPr>
@@ -1539,19 +1353,13 @@
               <a:rPr lang="en-GB"/>
               <a:t>Click to edit Master title style</a:t>
             </a:r>
-            <a:endParaRPr lang="en-NL"/>
-          </a:p>
-        </p:txBody>
-      </p:sp>
-      <p:sp>
-        <p:nvSpPr>
-          <p:cNvPr id="3" name="Text Placeholder 2">
-            <a:extLst>
-              <a:ext uri="{FF2B5EF4-FFF2-40B4-BE49-F238E27FC236}">
-                <a16:creationId xmlns:a16="http://schemas.microsoft.com/office/drawing/2014/main" id="{329A4AC9-7B27-F240-B9F4-992C93256713}"/>
-              </a:ext>
-            </a:extLst>
-          </p:cNvPr>
+            <a:endParaRPr lang="en-US" dirty="0"/>
+          </a:p>
+        </p:txBody>
+      </p:sp>
+      <p:sp>
+        <p:nvSpPr>
+          <p:cNvPr id="3" name="Text Placeholder 2"/>
           <p:cNvSpPr>
             <a:spLocks noGrp="1"/>
           </p:cNvSpPr>
@@ -1616,13 +1424,7 @@
       </p:sp>
       <p:sp>
         <p:nvSpPr>
-          <p:cNvPr id="4" name="Content Placeholder 3">
-            <a:extLst>
-              <a:ext uri="{FF2B5EF4-FFF2-40B4-BE49-F238E27FC236}">
-                <a16:creationId xmlns:a16="http://schemas.microsoft.com/office/drawing/2014/main" id="{6FD09732-81D5-8141-A60A-B7D14BED0915}"/>
-              </a:ext>
-            </a:extLst>
-          </p:cNvPr>
+          <p:cNvPr id="4" name="Content Placeholder 3"/>
           <p:cNvSpPr>
             <a:spLocks noGrp="1"/>
           </p:cNvSpPr>
@@ -1673,19 +1475,13 @@
               <a:rPr lang="en-GB"/>
               <a:t>Fifth level</a:t>
             </a:r>
-            <a:endParaRPr lang="en-NL"/>
-          </a:p>
-        </p:txBody>
-      </p:sp>
-      <p:sp>
-        <p:nvSpPr>
-          <p:cNvPr id="5" name="Text Placeholder 4">
-            <a:extLst>
-              <a:ext uri="{FF2B5EF4-FFF2-40B4-BE49-F238E27FC236}">
-                <a16:creationId xmlns:a16="http://schemas.microsoft.com/office/drawing/2014/main" id="{FBA1680A-B744-8944-9F22-295EAAC7DE27}"/>
-              </a:ext>
-            </a:extLst>
-          </p:cNvPr>
+            <a:endParaRPr lang="en-US" dirty="0"/>
+          </a:p>
+        </p:txBody>
+      </p:sp>
+      <p:sp>
+        <p:nvSpPr>
+          <p:cNvPr id="5" name="Text Placeholder 4"/>
           <p:cNvSpPr>
             <a:spLocks noGrp="1"/>
           </p:cNvSpPr>
@@ -1750,13 +1546,7 @@
       </p:sp>
       <p:sp>
         <p:nvSpPr>
-          <p:cNvPr id="6" name="Content Placeholder 5">
-            <a:extLst>
-              <a:ext uri="{FF2B5EF4-FFF2-40B4-BE49-F238E27FC236}">
-                <a16:creationId xmlns:a16="http://schemas.microsoft.com/office/drawing/2014/main" id="{268D8D83-B7A5-3643-9D8D-C27305A3007C}"/>
-              </a:ext>
-            </a:extLst>
-          </p:cNvPr>
+          <p:cNvPr id="6" name="Content Placeholder 5"/>
           <p:cNvSpPr>
             <a:spLocks noGrp="1"/>
           </p:cNvSpPr>
@@ -1807,19 +1597,13 @@
               <a:rPr lang="en-GB"/>
               <a:t>Fifth level</a:t>
             </a:r>
-            <a:endParaRPr lang="en-NL"/>
-          </a:p>
-        </p:txBody>
-      </p:sp>
-      <p:sp>
-        <p:nvSpPr>
-          <p:cNvPr id="7" name="Date Placeholder 6">
-            <a:extLst>
-              <a:ext uri="{FF2B5EF4-FFF2-40B4-BE49-F238E27FC236}">
-                <a16:creationId xmlns:a16="http://schemas.microsoft.com/office/drawing/2014/main" id="{AC85D983-3596-C744-A18C-34143E8720E4}"/>
-              </a:ext>
-            </a:extLst>
-          </p:cNvPr>
+            <a:endParaRPr lang="en-US" dirty="0"/>
+          </a:p>
+        </p:txBody>
+      </p:sp>
+      <p:sp>
+        <p:nvSpPr>
+          <p:cNvPr id="7" name="Date Placeholder 6"/>
           <p:cNvSpPr>
             <a:spLocks noGrp="1"/>
           </p:cNvSpPr>
@@ -1843,13 +1627,7 @@
       </p:sp>
       <p:sp>
         <p:nvSpPr>
-          <p:cNvPr id="8" name="Footer Placeholder 7">
-            <a:extLst>
-              <a:ext uri="{FF2B5EF4-FFF2-40B4-BE49-F238E27FC236}">
-                <a16:creationId xmlns:a16="http://schemas.microsoft.com/office/drawing/2014/main" id="{FC78DF57-528F-6342-B59F-F65BF12849A7}"/>
-              </a:ext>
-            </a:extLst>
-          </p:cNvPr>
+          <p:cNvPr id="8" name="Footer Placeholder 7"/>
           <p:cNvSpPr>
             <a:spLocks noGrp="1"/>
           </p:cNvSpPr>
@@ -1868,13 +1646,7 @@
       </p:sp>
       <p:sp>
         <p:nvSpPr>
-          <p:cNvPr id="9" name="Slide Number Placeholder 8">
-            <a:extLst>
-              <a:ext uri="{FF2B5EF4-FFF2-40B4-BE49-F238E27FC236}">
-                <a16:creationId xmlns:a16="http://schemas.microsoft.com/office/drawing/2014/main" id="{062E4E28-DEFB-1740-9BF8-566C2863F530}"/>
-              </a:ext>
-            </a:extLst>
-          </p:cNvPr>
+          <p:cNvPr id="9" name="Slide Number Placeholder 8"/>
           <p:cNvSpPr>
             <a:spLocks noGrp="1"/>
           </p:cNvSpPr>
@@ -1899,7 +1671,7 @@
     </p:spTree>
     <p:extLst>
       <p:ext uri="{BB962C8B-B14F-4D97-AF65-F5344CB8AC3E}">
-        <p14:creationId xmlns:p14="http://schemas.microsoft.com/office/powerpoint/2010/main" val="1441988541"/>
+        <p14:creationId xmlns:p14="http://schemas.microsoft.com/office/powerpoint/2010/main" val="261377659"/>
       </p:ext>
     </p:extLst>
   </p:cSld>
@@ -1928,13 +1700,7 @@
       </p:grpSpPr>
       <p:sp>
         <p:nvSpPr>
-          <p:cNvPr id="2" name="Title 1">
-            <a:extLst>
-              <a:ext uri="{FF2B5EF4-FFF2-40B4-BE49-F238E27FC236}">
-                <a16:creationId xmlns:a16="http://schemas.microsoft.com/office/drawing/2014/main" id="{B776F655-31DD-354A-ABFE-7C8076ECC9D0}"/>
-              </a:ext>
-            </a:extLst>
-          </p:cNvPr>
+          <p:cNvPr id="2" name="Title 1"/>
           <p:cNvSpPr>
             <a:spLocks noGrp="1"/>
           </p:cNvSpPr>
@@ -1951,19 +1717,13 @@
               <a:rPr lang="en-GB"/>
               <a:t>Click to edit Master title style</a:t>
             </a:r>
-            <a:endParaRPr lang="en-NL"/>
-          </a:p>
-        </p:txBody>
-      </p:sp>
-      <p:sp>
-        <p:nvSpPr>
-          <p:cNvPr id="3" name="Date Placeholder 2">
-            <a:extLst>
-              <a:ext uri="{FF2B5EF4-FFF2-40B4-BE49-F238E27FC236}">
-                <a16:creationId xmlns:a16="http://schemas.microsoft.com/office/drawing/2014/main" id="{3CD5B552-5C3E-8943-9281-C7EDDB1450B4}"/>
-              </a:ext>
-            </a:extLst>
-          </p:cNvPr>
+            <a:endParaRPr lang="en-US" dirty="0"/>
+          </a:p>
+        </p:txBody>
+      </p:sp>
+      <p:sp>
+        <p:nvSpPr>
+          <p:cNvPr id="3" name="Date Placeholder 2"/>
           <p:cNvSpPr>
             <a:spLocks noGrp="1"/>
           </p:cNvSpPr>
@@ -1986,13 +1746,7 @@
       </p:sp>
       <p:sp>
         <p:nvSpPr>
-          <p:cNvPr id="4" name="Footer Placeholder 3">
-            <a:extLst>
-              <a:ext uri="{FF2B5EF4-FFF2-40B4-BE49-F238E27FC236}">
-                <a16:creationId xmlns:a16="http://schemas.microsoft.com/office/drawing/2014/main" id="{7F94EDAD-42A0-F34C-A668-465FCAD97AF9}"/>
-              </a:ext>
-            </a:extLst>
-          </p:cNvPr>
+          <p:cNvPr id="4" name="Footer Placeholder 3"/>
           <p:cNvSpPr>
             <a:spLocks noGrp="1"/>
           </p:cNvSpPr>
@@ -2011,13 +1765,7 @@
       </p:sp>
       <p:sp>
         <p:nvSpPr>
-          <p:cNvPr id="5" name="Slide Number Placeholder 4">
-            <a:extLst>
-              <a:ext uri="{FF2B5EF4-FFF2-40B4-BE49-F238E27FC236}">
-                <a16:creationId xmlns:a16="http://schemas.microsoft.com/office/drawing/2014/main" id="{4E6B1BCB-FE7F-8647-A253-CAB2BBC1D48C}"/>
-              </a:ext>
-            </a:extLst>
-          </p:cNvPr>
+          <p:cNvPr id="5" name="Slide Number Placeholder 4"/>
           <p:cNvSpPr>
             <a:spLocks noGrp="1"/>
           </p:cNvSpPr>
@@ -2041,7 +1789,7 @@
     </p:spTree>
     <p:extLst>
       <p:ext uri="{BB962C8B-B14F-4D97-AF65-F5344CB8AC3E}">
-        <p14:creationId xmlns:p14="http://schemas.microsoft.com/office/powerpoint/2010/main" val="3038140277"/>
+        <p14:creationId xmlns:p14="http://schemas.microsoft.com/office/powerpoint/2010/main" val="3272080118"/>
       </p:ext>
     </p:extLst>
   </p:cSld>
@@ -2070,13 +1818,7 @@
       </p:grpSpPr>
       <p:sp>
         <p:nvSpPr>
-          <p:cNvPr id="2" name="Date Placeholder 1">
-            <a:extLst>
-              <a:ext uri="{FF2B5EF4-FFF2-40B4-BE49-F238E27FC236}">
-                <a16:creationId xmlns:a16="http://schemas.microsoft.com/office/drawing/2014/main" id="{56C637BF-E494-4A4E-A838-1B4673652D7B}"/>
-              </a:ext>
-            </a:extLst>
-          </p:cNvPr>
+          <p:cNvPr id="2" name="Date Placeholder 1"/>
           <p:cNvSpPr>
             <a:spLocks noGrp="1"/>
           </p:cNvSpPr>
@@ -2099,13 +1841,7 @@
       </p:sp>
       <p:sp>
         <p:nvSpPr>
-          <p:cNvPr id="3" name="Footer Placeholder 2">
-            <a:extLst>
-              <a:ext uri="{FF2B5EF4-FFF2-40B4-BE49-F238E27FC236}">
-                <a16:creationId xmlns:a16="http://schemas.microsoft.com/office/drawing/2014/main" id="{61DD903D-D2DC-7742-8A34-B35478312891}"/>
-              </a:ext>
-            </a:extLst>
-          </p:cNvPr>
+          <p:cNvPr id="3" name="Footer Placeholder 2"/>
           <p:cNvSpPr>
             <a:spLocks noGrp="1"/>
           </p:cNvSpPr>
@@ -2124,13 +1860,7 @@
       </p:sp>
       <p:sp>
         <p:nvSpPr>
-          <p:cNvPr id="4" name="Slide Number Placeholder 3">
-            <a:extLst>
-              <a:ext uri="{FF2B5EF4-FFF2-40B4-BE49-F238E27FC236}">
-                <a16:creationId xmlns:a16="http://schemas.microsoft.com/office/drawing/2014/main" id="{81EE2E38-4EE0-3549-90F4-3145476E0A6D}"/>
-              </a:ext>
-            </a:extLst>
-          </p:cNvPr>
+          <p:cNvPr id="4" name="Slide Number Placeholder 3"/>
           <p:cNvSpPr>
             <a:spLocks noGrp="1"/>
           </p:cNvSpPr>
@@ -2154,7 +1884,7 @@
     </p:spTree>
     <p:extLst>
       <p:ext uri="{BB962C8B-B14F-4D97-AF65-F5344CB8AC3E}">
-        <p14:creationId xmlns:p14="http://schemas.microsoft.com/office/powerpoint/2010/main" val="3732629732"/>
+        <p14:creationId xmlns:p14="http://schemas.microsoft.com/office/powerpoint/2010/main" val="1624299193"/>
       </p:ext>
     </p:extLst>
   </p:cSld>
@@ -2183,13 +1913,7 @@
       </p:grpSpPr>
       <p:sp>
         <p:nvSpPr>
-          <p:cNvPr id="2" name="Title 1">
-            <a:extLst>
-              <a:ext uri="{FF2B5EF4-FFF2-40B4-BE49-F238E27FC236}">
-                <a16:creationId xmlns:a16="http://schemas.microsoft.com/office/drawing/2014/main" id="{F0D36127-AA80-084A-9ACE-CC1E1173BC6A}"/>
-              </a:ext>
-            </a:extLst>
-          </p:cNvPr>
+          <p:cNvPr id="2" name="Title 1"/>
           <p:cNvSpPr>
             <a:spLocks noGrp="1"/>
           </p:cNvSpPr>
@@ -2215,19 +1939,13 @@
               <a:rPr lang="en-GB"/>
               <a:t>Click to edit Master title style</a:t>
             </a:r>
-            <a:endParaRPr lang="en-NL"/>
-          </a:p>
-        </p:txBody>
-      </p:sp>
-      <p:sp>
-        <p:nvSpPr>
-          <p:cNvPr id="3" name="Content Placeholder 2">
-            <a:extLst>
-              <a:ext uri="{FF2B5EF4-FFF2-40B4-BE49-F238E27FC236}">
-                <a16:creationId xmlns:a16="http://schemas.microsoft.com/office/drawing/2014/main" id="{77FCF472-E65A-4640-98D3-49141F39DD16}"/>
-              </a:ext>
-            </a:extLst>
-          </p:cNvPr>
+            <a:endParaRPr lang="en-US" dirty="0"/>
+          </a:p>
+        </p:txBody>
+      </p:sp>
+      <p:sp>
+        <p:nvSpPr>
+          <p:cNvPr id="3" name="Content Placeholder 2"/>
           <p:cNvSpPr>
             <a:spLocks noGrp="1"/>
           </p:cNvSpPr>
@@ -2306,19 +2024,13 @@
               <a:rPr lang="en-GB"/>
               <a:t>Fifth level</a:t>
             </a:r>
-            <a:endParaRPr lang="en-NL"/>
-          </a:p>
-        </p:txBody>
-      </p:sp>
-      <p:sp>
-        <p:nvSpPr>
-          <p:cNvPr id="4" name="Text Placeholder 3">
-            <a:extLst>
-              <a:ext uri="{FF2B5EF4-FFF2-40B4-BE49-F238E27FC236}">
-                <a16:creationId xmlns:a16="http://schemas.microsoft.com/office/drawing/2014/main" id="{917845C9-45E3-A040-A207-16B7FE9FAFD2}"/>
-              </a:ext>
-            </a:extLst>
-          </p:cNvPr>
+            <a:endParaRPr lang="en-US" dirty="0"/>
+          </a:p>
+        </p:txBody>
+      </p:sp>
+      <p:sp>
+        <p:nvSpPr>
+          <p:cNvPr id="4" name="Text Placeholder 3"/>
           <p:cNvSpPr>
             <a:spLocks noGrp="1"/>
           </p:cNvSpPr>
@@ -2383,13 +2095,7 @@
       </p:sp>
       <p:sp>
         <p:nvSpPr>
-          <p:cNvPr id="5" name="Date Placeholder 4">
-            <a:extLst>
-              <a:ext uri="{FF2B5EF4-FFF2-40B4-BE49-F238E27FC236}">
-                <a16:creationId xmlns:a16="http://schemas.microsoft.com/office/drawing/2014/main" id="{EC63FD32-092C-624E-B1C0-DB6F1AC964DE}"/>
-              </a:ext>
-            </a:extLst>
-          </p:cNvPr>
+          <p:cNvPr id="5" name="Date Placeholder 4"/>
           <p:cNvSpPr>
             <a:spLocks noGrp="1"/>
           </p:cNvSpPr>
@@ -2413,13 +2119,7 @@
       </p:sp>
       <p:sp>
         <p:nvSpPr>
-          <p:cNvPr id="6" name="Footer Placeholder 5">
-            <a:extLst>
-              <a:ext uri="{FF2B5EF4-FFF2-40B4-BE49-F238E27FC236}">
-                <a16:creationId xmlns:a16="http://schemas.microsoft.com/office/drawing/2014/main" id="{7B2D6040-3E19-E943-833E-41CDDF64CF5F}"/>
-              </a:ext>
-            </a:extLst>
-          </p:cNvPr>
+          <p:cNvPr id="6" name="Footer Placeholder 5"/>
           <p:cNvSpPr>
             <a:spLocks noGrp="1"/>
           </p:cNvSpPr>
@@ -2438,13 +2138,7 @@
       </p:sp>
       <p:sp>
         <p:nvSpPr>
-          <p:cNvPr id="7" name="Slide Number Placeholder 6">
-            <a:extLst>
-              <a:ext uri="{FF2B5EF4-FFF2-40B4-BE49-F238E27FC236}">
-                <a16:creationId xmlns:a16="http://schemas.microsoft.com/office/drawing/2014/main" id="{C57F1D08-BD34-F84C-8CCE-1B6C98E3A19D}"/>
-              </a:ext>
-            </a:extLst>
-          </p:cNvPr>
+          <p:cNvPr id="7" name="Slide Number Placeholder 6"/>
           <p:cNvSpPr>
             <a:spLocks noGrp="1"/>
           </p:cNvSpPr>
@@ -2469,7 +2163,7 @@
     </p:spTree>
     <p:extLst>
       <p:ext uri="{BB962C8B-B14F-4D97-AF65-F5344CB8AC3E}">
-        <p14:creationId xmlns:p14="http://schemas.microsoft.com/office/powerpoint/2010/main" val="3715058420"/>
+        <p14:creationId xmlns:p14="http://schemas.microsoft.com/office/powerpoint/2010/main" val="4013241706"/>
       </p:ext>
     </p:extLst>
   </p:cSld>
@@ -2498,13 +2192,7 @@
       </p:grpSpPr>
       <p:sp>
         <p:nvSpPr>
-          <p:cNvPr id="2" name="Title 1">
-            <a:extLst>
-              <a:ext uri="{FF2B5EF4-FFF2-40B4-BE49-F238E27FC236}">
-                <a16:creationId xmlns:a16="http://schemas.microsoft.com/office/drawing/2014/main" id="{2AE06B05-C557-2341-8EA7-856C6A76AA24}"/>
-              </a:ext>
-            </a:extLst>
-          </p:cNvPr>
+          <p:cNvPr id="2" name="Title 1"/>
           <p:cNvSpPr>
             <a:spLocks noGrp="1"/>
           </p:cNvSpPr>
@@ -2530,21 +2218,15 @@
               <a:rPr lang="en-GB"/>
               <a:t>Click to edit Master title style</a:t>
             </a:r>
-            <a:endParaRPr lang="en-NL"/>
-          </a:p>
-        </p:txBody>
-      </p:sp>
-      <p:sp>
-        <p:nvSpPr>
-          <p:cNvPr id="3" name="Picture Placeholder 2">
-            <a:extLst>
-              <a:ext uri="{FF2B5EF4-FFF2-40B4-BE49-F238E27FC236}">
-                <a16:creationId xmlns:a16="http://schemas.microsoft.com/office/drawing/2014/main" id="{9D377F16-C1C8-8F4C-8F93-DC3CE9E84273}"/>
-              </a:ext>
-            </a:extLst>
-          </p:cNvPr>
-          <p:cNvSpPr>
-            <a:spLocks noGrp="1"/>
+            <a:endParaRPr lang="en-US" dirty="0"/>
+          </a:p>
+        </p:txBody>
+      </p:sp>
+      <p:sp>
+        <p:nvSpPr>
+          <p:cNvPr id="3" name="Picture Placeholder 2"/>
+          <p:cNvSpPr>
+            <a:spLocks noGrp="1" noChangeAspect="1"/>
           </p:cNvSpPr>
           <p:nvPr>
             <p:ph type="pic" idx="1"/>
@@ -2557,7 +2239,7 @@
           </a:xfrm>
         </p:spPr>
         <p:txBody>
-          <a:bodyPr/>
+          <a:bodyPr anchor="t"/>
           <a:lstStyle>
             <a:lvl1pPr marL="0" indent="0">
               <a:buNone/>
@@ -2597,19 +2279,17 @@
             </a:lvl9pPr>
           </a:lstStyle>
           <a:p>
-            <a:endParaRPr lang="en-NL"/>
-          </a:p>
-        </p:txBody>
-      </p:sp>
-      <p:sp>
-        <p:nvSpPr>
-          <p:cNvPr id="4" name="Text Placeholder 3">
-            <a:extLst>
-              <a:ext uri="{FF2B5EF4-FFF2-40B4-BE49-F238E27FC236}">
-                <a16:creationId xmlns:a16="http://schemas.microsoft.com/office/drawing/2014/main" id="{333DF55B-7491-174A-BF17-53F8E4CA3234}"/>
-              </a:ext>
-            </a:extLst>
-          </p:cNvPr>
+            <a:r>
+              <a:rPr lang="en-GB"/>
+              <a:t>Click icon to add picture</a:t>
+            </a:r>
+            <a:endParaRPr lang="en-US" dirty="0"/>
+          </a:p>
+        </p:txBody>
+      </p:sp>
+      <p:sp>
+        <p:nvSpPr>
+          <p:cNvPr id="4" name="Text Placeholder 3"/>
           <p:cNvSpPr>
             <a:spLocks noGrp="1"/>
           </p:cNvSpPr>
@@ -2674,13 +2354,7 @@
       </p:sp>
       <p:sp>
         <p:nvSpPr>
-          <p:cNvPr id="5" name="Date Placeholder 4">
-            <a:extLst>
-              <a:ext uri="{FF2B5EF4-FFF2-40B4-BE49-F238E27FC236}">
-                <a16:creationId xmlns:a16="http://schemas.microsoft.com/office/drawing/2014/main" id="{127A4A0A-B0B3-1D49-AF70-80D31CF867F8}"/>
-              </a:ext>
-            </a:extLst>
-          </p:cNvPr>
+          <p:cNvPr id="5" name="Date Placeholder 4"/>
           <p:cNvSpPr>
             <a:spLocks noGrp="1"/>
           </p:cNvSpPr>
@@ -2704,13 +2378,7 @@
       </p:sp>
       <p:sp>
         <p:nvSpPr>
-          <p:cNvPr id="6" name="Footer Placeholder 5">
-            <a:extLst>
-              <a:ext uri="{FF2B5EF4-FFF2-40B4-BE49-F238E27FC236}">
-                <a16:creationId xmlns:a16="http://schemas.microsoft.com/office/drawing/2014/main" id="{F7B7B362-7AB2-7C48-93A9-4C7CAA083997}"/>
-              </a:ext>
-            </a:extLst>
-          </p:cNvPr>
+          <p:cNvPr id="6" name="Footer Placeholder 5"/>
           <p:cNvSpPr>
             <a:spLocks noGrp="1"/>
           </p:cNvSpPr>
@@ -2729,13 +2397,7 @@
       </p:sp>
       <p:sp>
         <p:nvSpPr>
-          <p:cNvPr id="7" name="Slide Number Placeholder 6">
-            <a:extLst>
-              <a:ext uri="{FF2B5EF4-FFF2-40B4-BE49-F238E27FC236}">
-                <a16:creationId xmlns:a16="http://schemas.microsoft.com/office/drawing/2014/main" id="{A3CD54CA-401F-704B-B2FA-D94A9ACDE073}"/>
-              </a:ext>
-            </a:extLst>
-          </p:cNvPr>
+          <p:cNvPr id="7" name="Slide Number Placeholder 6"/>
           <p:cNvSpPr>
             <a:spLocks noGrp="1"/>
           </p:cNvSpPr>
@@ -2759,7 +2421,7 @@
     </p:spTree>
     <p:extLst>
       <p:ext uri="{BB962C8B-B14F-4D97-AF65-F5344CB8AC3E}">
-        <p14:creationId xmlns:p14="http://schemas.microsoft.com/office/powerpoint/2010/main" val="2951699089"/>
+        <p14:creationId xmlns:p14="http://schemas.microsoft.com/office/powerpoint/2010/main" val="4076771397"/>
       </p:ext>
     </p:extLst>
   </p:cSld>
@@ -2793,13 +2455,7 @@
       </p:grpSpPr>
       <p:sp>
         <p:nvSpPr>
-          <p:cNvPr id="2" name="Title Placeholder 1">
-            <a:extLst>
-              <a:ext uri="{FF2B5EF4-FFF2-40B4-BE49-F238E27FC236}">
-                <a16:creationId xmlns:a16="http://schemas.microsoft.com/office/drawing/2014/main" id="{B16669D0-BEBA-3743-8249-BF40D89F6E61}"/>
-              </a:ext>
-            </a:extLst>
-          </p:cNvPr>
+          <p:cNvPr id="2" name="Title Placeholder 1"/>
           <p:cNvSpPr>
             <a:spLocks noGrp="1"/>
           </p:cNvSpPr>
@@ -2826,19 +2482,13 @@
               <a:rPr lang="en-GB"/>
               <a:t>Click to edit Master title style</a:t>
             </a:r>
-            <a:endParaRPr lang="en-NL"/>
-          </a:p>
-        </p:txBody>
-      </p:sp>
-      <p:sp>
-        <p:nvSpPr>
-          <p:cNvPr id="3" name="Text Placeholder 2">
-            <a:extLst>
-              <a:ext uri="{FF2B5EF4-FFF2-40B4-BE49-F238E27FC236}">
-                <a16:creationId xmlns:a16="http://schemas.microsoft.com/office/drawing/2014/main" id="{B2F582BF-3DF9-D24E-9CAC-3483A3375216}"/>
-              </a:ext>
-            </a:extLst>
-          </p:cNvPr>
+            <a:endParaRPr lang="en-US" dirty="0"/>
+          </a:p>
+        </p:txBody>
+      </p:sp>
+      <p:sp>
+        <p:nvSpPr>
+          <p:cNvPr id="3" name="Text Placeholder 2"/>
           <p:cNvSpPr>
             <a:spLocks noGrp="1"/>
           </p:cNvSpPr>
@@ -2894,19 +2544,13 @@
               <a:rPr lang="en-GB"/>
               <a:t>Fifth level</a:t>
             </a:r>
-            <a:endParaRPr lang="en-NL"/>
-          </a:p>
-        </p:txBody>
-      </p:sp>
-      <p:sp>
-        <p:nvSpPr>
-          <p:cNvPr id="4" name="Date Placeholder 3">
-            <a:extLst>
-              <a:ext uri="{FF2B5EF4-FFF2-40B4-BE49-F238E27FC236}">
-                <a16:creationId xmlns:a16="http://schemas.microsoft.com/office/drawing/2014/main" id="{936F3AAD-DFDD-FB4C-A392-696602CBB94D}"/>
-              </a:ext>
-            </a:extLst>
-          </p:cNvPr>
+            <a:endParaRPr lang="en-US" dirty="0"/>
+          </a:p>
+        </p:txBody>
+      </p:sp>
+      <p:sp>
+        <p:nvSpPr>
+          <p:cNvPr id="4" name="Date Placeholder 3"/>
           <p:cNvSpPr>
             <a:spLocks noGrp="1"/>
           </p:cNvSpPr>
@@ -2948,13 +2592,7 @@
       </p:sp>
       <p:sp>
         <p:nvSpPr>
-          <p:cNvPr id="5" name="Footer Placeholder 4">
-            <a:extLst>
-              <a:ext uri="{FF2B5EF4-FFF2-40B4-BE49-F238E27FC236}">
-                <a16:creationId xmlns:a16="http://schemas.microsoft.com/office/drawing/2014/main" id="{8D1168D5-835A-5E4B-9BCA-3F0519FBD3CC}"/>
-              </a:ext>
-            </a:extLst>
-          </p:cNvPr>
+          <p:cNvPr id="5" name="Footer Placeholder 4"/>
           <p:cNvSpPr>
             <a:spLocks noGrp="1"/>
           </p:cNvSpPr>
@@ -2991,13 +2629,7 @@
       </p:sp>
       <p:sp>
         <p:nvSpPr>
-          <p:cNvPr id="6" name="Slide Number Placeholder 5">
-            <a:extLst>
-              <a:ext uri="{FF2B5EF4-FFF2-40B4-BE49-F238E27FC236}">
-                <a16:creationId xmlns:a16="http://schemas.microsoft.com/office/drawing/2014/main" id="{AFE77E3F-C33A-5049-A208-5D4FC8DCE7CF}"/>
-              </a:ext>
-            </a:extLst>
-          </p:cNvPr>
+          <p:cNvPr id="6" name="Slide Number Placeholder 5"/>
           <p:cNvSpPr>
             <a:spLocks noGrp="1"/>
           </p:cNvSpPr>
@@ -3040,23 +2672,23 @@
     </p:spTree>
     <p:extLst>
       <p:ext uri="{BB962C8B-B14F-4D97-AF65-F5344CB8AC3E}">
-        <p14:creationId xmlns:p14="http://schemas.microsoft.com/office/powerpoint/2010/main" val="1401994660"/>
+        <p14:creationId xmlns:p14="http://schemas.microsoft.com/office/powerpoint/2010/main" val="1642756215"/>
       </p:ext>
     </p:extLst>
   </p:cSld>
   <p:clrMap bg1="lt1" tx1="dk1" bg2="lt2" tx2="dk2" accent1="accent1" accent2="accent2" accent3="accent3" accent4="accent4" accent5="accent5" accent6="accent6" hlink="hlink" folHlink="folHlink"/>
   <p:sldLayoutIdLst>
-    <p:sldLayoutId id="2147483857" r:id="rId1"/>
-    <p:sldLayoutId id="2147483858" r:id="rId2"/>
-    <p:sldLayoutId id="2147483859" r:id="rId3"/>
-    <p:sldLayoutId id="2147483860" r:id="rId4"/>
-    <p:sldLayoutId id="2147483861" r:id="rId5"/>
-    <p:sldLayoutId id="2147483862" r:id="rId6"/>
-    <p:sldLayoutId id="2147483863" r:id="rId7"/>
-    <p:sldLayoutId id="2147483864" r:id="rId8"/>
-    <p:sldLayoutId id="2147483865" r:id="rId9"/>
-    <p:sldLayoutId id="2147483866" r:id="rId10"/>
-    <p:sldLayoutId id="2147483867" r:id="rId11"/>
+    <p:sldLayoutId id="2147483881" r:id="rId1"/>
+    <p:sldLayoutId id="2147483882" r:id="rId2"/>
+    <p:sldLayoutId id="2147483883" r:id="rId3"/>
+    <p:sldLayoutId id="2147483884" r:id="rId4"/>
+    <p:sldLayoutId id="2147483885" r:id="rId5"/>
+    <p:sldLayoutId id="2147483886" r:id="rId6"/>
+    <p:sldLayoutId id="2147483887" r:id="rId7"/>
+    <p:sldLayoutId id="2147483888" r:id="rId8"/>
+    <p:sldLayoutId id="2147483889" r:id="rId9"/>
+    <p:sldLayoutId id="2147483890" r:id="rId10"/>
+    <p:sldLayoutId id="2147483891" r:id="rId11"/>
   </p:sldLayoutIdLst>
   <p:txStyles>
     <p:titleStyle>
@@ -3244,7 +2876,7 @@
     </p:bodyStyle>
     <p:otherStyle>
       <a:defPPr>
-        <a:defRPr lang="en-NL"/>
+        <a:defRPr lang="en-US"/>
       </a:defPPr>
       <a:lvl1pPr marL="0" algn="l" defTabSz="914400" rtl="0" eaLnBrk="1" latinLnBrk="0" hangingPunct="1">
         <a:defRPr sz="1800" kern="1200">
@@ -3379,7 +3011,17 @@
           <a:bodyPr/>
           <a:lstStyle/>
           <a:p>
-            <a:endParaRPr lang="en-NL"/>
+            <a:r>
+              <a:rPr lang="en-NL" dirty="0"/>
+              <a:t>Quadratic Classifier</a:t>
+            </a:r>
+            <a:br>
+              <a:rPr lang="en-NL" dirty="0"/>
+            </a:br>
+            <a:r>
+              <a:rPr lang="en-NL" dirty="0"/>
+              <a:t>Update</a:t>
+            </a:r>
           </a:p>
         </p:txBody>
       </p:sp>
@@ -3404,7 +3046,10 @@
           <a:bodyPr/>
           <a:lstStyle/>
           <a:p>
-            <a:endParaRPr lang="en-NL"/>
+            <a:r>
+              <a:rPr lang="en-NL" dirty="0"/>
+              <a:t>22/01/2021</a:t>
+            </a:r>
           </a:p>
         </p:txBody>
       </p:sp>
@@ -3443,6 +3088,310 @@
           <p:cNvPr id="2" name="Title 1">
             <a:extLst>
               <a:ext uri="{FF2B5EF4-FFF2-40B4-BE49-F238E27FC236}">
+                <a16:creationId xmlns:a16="http://schemas.microsoft.com/office/drawing/2014/main" id="{56D38432-CA58-1D41-AAFC-09961C18BB7F}"/>
+              </a:ext>
+            </a:extLst>
+          </p:cNvPr>
+          <p:cNvSpPr>
+            <a:spLocks noGrp="1"/>
+          </p:cNvSpPr>
+          <p:nvPr>
+            <p:ph type="title"/>
+          </p:nvPr>
+        </p:nvSpPr>
+        <p:spPr/>
+        <p:txBody>
+          <a:bodyPr/>
+          <a:lstStyle/>
+          <a:p>
+            <a:r>
+              <a:rPr lang="en-NL" dirty="0"/>
+              <a:t>Contents</a:t>
+            </a:r>
+          </a:p>
+        </p:txBody>
+      </p:sp>
+      <p:sp>
+        <p:nvSpPr>
+          <p:cNvPr id="3" name="Content Placeholder 2">
+            <a:extLst>
+              <a:ext uri="{FF2B5EF4-FFF2-40B4-BE49-F238E27FC236}">
+                <a16:creationId xmlns:a16="http://schemas.microsoft.com/office/drawing/2014/main" id="{88CC176A-925C-6342-964C-6D02709FAACF}"/>
+              </a:ext>
+            </a:extLst>
+          </p:cNvPr>
+          <p:cNvSpPr>
+            <a:spLocks noGrp="1"/>
+          </p:cNvSpPr>
+          <p:nvPr>
+            <p:ph idx="1"/>
+          </p:nvPr>
+        </p:nvSpPr>
+        <p:spPr/>
+        <p:txBody>
+          <a:bodyPr/>
+          <a:lstStyle/>
+          <a:p>
+            <a:r>
+              <a:rPr lang="en-NL" dirty="0"/>
+              <a:t>Energy growing effects at EFT NLO</a:t>
+            </a:r>
+          </a:p>
+          <a:p>
+            <a:r>
+              <a:rPr lang="en-NL" dirty="0"/>
+              <a:t>Sanity check: overfitting the QC</a:t>
+            </a:r>
+          </a:p>
+          <a:p>
+            <a:r>
+              <a:rPr lang="en-NL" dirty="0"/>
+              <a:t>Point by point comparison (wip)</a:t>
+            </a:r>
+          </a:p>
+          <a:p>
+            <a:endParaRPr lang="en-NL" dirty="0"/>
+          </a:p>
+        </p:txBody>
+      </p:sp>
+    </p:spTree>
+    <p:extLst>
+      <p:ext uri="{BB962C8B-B14F-4D97-AF65-F5344CB8AC3E}">
+        <p14:creationId xmlns:p14="http://schemas.microsoft.com/office/powerpoint/2010/main" val="1298361501"/>
+      </p:ext>
+    </p:extLst>
+  </p:cSld>
+  <p:clrMapOvr>
+    <a:masterClrMapping/>
+  </p:clrMapOvr>
+</p:sld>
+</file>
+
+<file path=ppt/slides/slide3.xml><?xml version="1.0" encoding="utf-8"?>
+<p:sld xmlns:a="http://schemas.openxmlformats.org/drawingml/2006/main" xmlns:r="http://schemas.openxmlformats.org/officeDocument/2006/relationships" xmlns:p="http://schemas.openxmlformats.org/presentationml/2006/main">
+  <p:cSld>
+    <p:spTree>
+      <p:nvGrpSpPr>
+        <p:cNvPr id="1" name=""/>
+        <p:cNvGrpSpPr/>
+        <p:nvPr/>
+      </p:nvGrpSpPr>
+      <p:grpSpPr>
+        <a:xfrm>
+          <a:off x="0" y="0"/>
+          <a:ext cx="0" cy="0"/>
+          <a:chOff x="0" y="0"/>
+          <a:chExt cx="0" cy="0"/>
+        </a:xfrm>
+      </p:grpSpPr>
+      <p:sp>
+        <p:nvSpPr>
+          <p:cNvPr id="2" name="Title 1">
+            <a:extLst>
+              <a:ext uri="{FF2B5EF4-FFF2-40B4-BE49-F238E27FC236}">
+                <a16:creationId xmlns:a16="http://schemas.microsoft.com/office/drawing/2014/main" id="{7FCA6FEE-E16C-9C49-834C-E5601B654C69}"/>
+              </a:ext>
+            </a:extLst>
+          </p:cNvPr>
+          <p:cNvSpPr>
+            <a:spLocks noGrp="1"/>
+          </p:cNvSpPr>
+          <p:nvPr>
+            <p:ph type="title"/>
+          </p:nvPr>
+        </p:nvSpPr>
+        <p:spPr/>
+        <p:txBody>
+          <a:bodyPr/>
+          <a:lstStyle/>
+          <a:p>
+            <a:r>
+              <a:rPr lang="en-NL" dirty="0"/>
+              <a:t>Energy growing effects - update</a:t>
+            </a:r>
+          </a:p>
+        </p:txBody>
+      </p:sp>
+      <p:pic>
+        <p:nvPicPr>
+          <p:cNvPr id="5" name="Picture 4">
+            <a:extLst>
+              <a:ext uri="{FF2B5EF4-FFF2-40B4-BE49-F238E27FC236}">
+                <a16:creationId xmlns:a16="http://schemas.microsoft.com/office/drawing/2014/main" id="{85582EB8-C0B8-1447-A45E-C9B654E8978E}"/>
+              </a:ext>
+            </a:extLst>
+          </p:cNvPr>
+          <p:cNvPicPr>
+            <a:picLocks noChangeAspect="1"/>
+          </p:cNvPicPr>
+          <p:nvPr/>
+        </p:nvPicPr>
+        <p:blipFill rotWithShape="1">
+          <a:blip r:embed="rId2"/>
+          <a:srcRect l="4441" t="5271" r="11033"/>
+          <a:stretch/>
+        </p:blipFill>
+        <p:spPr>
+          <a:xfrm>
+            <a:off x="6038336" y="1458098"/>
+            <a:ext cx="6153664" cy="5176109"/>
+          </a:xfrm>
+          <a:prstGeom prst="rect">
+            <a:avLst/>
+          </a:prstGeom>
+        </p:spPr>
+      </p:pic>
+      <p:pic>
+        <p:nvPicPr>
+          <p:cNvPr id="7" name="Picture 6">
+            <a:extLst>
+              <a:ext uri="{FF2B5EF4-FFF2-40B4-BE49-F238E27FC236}">
+                <a16:creationId xmlns:a16="http://schemas.microsoft.com/office/drawing/2014/main" id="{15058B55-66C2-0141-B27A-7A2CFE248B68}"/>
+              </a:ext>
+            </a:extLst>
+          </p:cNvPr>
+          <p:cNvPicPr>
+            <a:picLocks noChangeAspect="1"/>
+          </p:cNvPicPr>
+          <p:nvPr/>
+        </p:nvPicPr>
+        <p:blipFill rotWithShape="1">
+          <a:blip r:embed="rId3"/>
+          <a:srcRect l="3708" r="8492"/>
+          <a:stretch/>
+        </p:blipFill>
+        <p:spPr>
+          <a:xfrm>
+            <a:off x="76132" y="1297460"/>
+            <a:ext cx="6019868" cy="5145990"/>
+          </a:xfrm>
+          <a:prstGeom prst="rect">
+            <a:avLst/>
+          </a:prstGeom>
+        </p:spPr>
+      </p:pic>
+    </p:spTree>
+    <p:extLst>
+      <p:ext uri="{BB962C8B-B14F-4D97-AF65-F5344CB8AC3E}">
+        <p14:creationId xmlns:p14="http://schemas.microsoft.com/office/powerpoint/2010/main" val="1760815559"/>
+      </p:ext>
+    </p:extLst>
+  </p:cSld>
+  <p:clrMapOvr>
+    <a:masterClrMapping/>
+  </p:clrMapOvr>
+</p:sld>
+</file>
+
+<file path=ppt/slides/slide4.xml><?xml version="1.0" encoding="utf-8"?>
+<p:sld xmlns:a="http://schemas.openxmlformats.org/drawingml/2006/main" xmlns:r="http://schemas.openxmlformats.org/officeDocument/2006/relationships" xmlns:p="http://schemas.openxmlformats.org/presentationml/2006/main">
+  <p:cSld>
+    <p:spTree>
+      <p:nvGrpSpPr>
+        <p:cNvPr id="1" name=""/>
+        <p:cNvGrpSpPr/>
+        <p:nvPr/>
+      </p:nvGrpSpPr>
+      <p:grpSpPr>
+        <a:xfrm>
+          <a:off x="0" y="0"/>
+          <a:ext cx="0" cy="0"/>
+          <a:chOff x="0" y="0"/>
+          <a:chExt cx="0" cy="0"/>
+        </a:xfrm>
+      </p:grpSpPr>
+      <p:sp>
+        <p:nvSpPr>
+          <p:cNvPr id="10" name="Title 1">
+            <a:extLst>
+              <a:ext uri="{FF2B5EF4-FFF2-40B4-BE49-F238E27FC236}">
+                <a16:creationId xmlns:a16="http://schemas.microsoft.com/office/drawing/2014/main" id="{FC198798-7513-B247-9B2A-89D0F44D2F81}"/>
+              </a:ext>
+            </a:extLst>
+          </p:cNvPr>
+          <p:cNvSpPr>
+            <a:spLocks noGrp="1"/>
+          </p:cNvSpPr>
+          <p:nvPr>
+            <p:ph type="title"/>
+          </p:nvPr>
+        </p:nvSpPr>
+        <p:spPr/>
+        <p:txBody>
+          <a:bodyPr/>
+          <a:lstStyle/>
+          <a:p>
+            <a:r>
+              <a:rPr lang="en-NL" dirty="0"/>
+              <a:t>Energy growing effects - update</a:t>
+            </a:r>
+          </a:p>
+        </p:txBody>
+      </p:sp>
+      <p:pic>
+        <p:nvPicPr>
+          <p:cNvPr id="9" name="Content Placeholder 8">
+            <a:extLst>
+              <a:ext uri="{FF2B5EF4-FFF2-40B4-BE49-F238E27FC236}">
+                <a16:creationId xmlns:a16="http://schemas.microsoft.com/office/drawing/2014/main" id="{0DAE6A19-4261-6645-83F6-411B0A79EC0E}"/>
+              </a:ext>
+            </a:extLst>
+          </p:cNvPr>
+          <p:cNvPicPr>
+            <a:picLocks noGrp="1" noChangeAspect="1"/>
+          </p:cNvPicPr>
+          <p:nvPr>
+            <p:ph idx="1"/>
+          </p:nvPr>
+        </p:nvPicPr>
+        <p:blipFill>
+          <a:blip r:embed="rId2"/>
+          <a:stretch>
+            <a:fillRect/>
+          </a:stretch>
+        </p:blipFill>
+        <p:spPr>
+          <a:xfrm>
+            <a:off x="2394015" y="1479635"/>
+            <a:ext cx="6922979" cy="5195989"/>
+          </a:xfrm>
+        </p:spPr>
+      </p:pic>
+    </p:spTree>
+    <p:extLst>
+      <p:ext uri="{BB962C8B-B14F-4D97-AF65-F5344CB8AC3E}">
+        <p14:creationId xmlns:p14="http://schemas.microsoft.com/office/powerpoint/2010/main" val="4199482202"/>
+      </p:ext>
+    </p:extLst>
+  </p:cSld>
+  <p:clrMapOvr>
+    <a:masterClrMapping/>
+  </p:clrMapOvr>
+</p:sld>
+</file>
+
+<file path=ppt/slides/slide5.xml><?xml version="1.0" encoding="utf-8"?>
+<p:sld xmlns:a="http://schemas.openxmlformats.org/drawingml/2006/main" xmlns:r="http://schemas.openxmlformats.org/officeDocument/2006/relationships" xmlns:p="http://schemas.openxmlformats.org/presentationml/2006/main">
+  <p:cSld>
+    <p:spTree>
+      <p:nvGrpSpPr>
+        <p:cNvPr id="1" name=""/>
+        <p:cNvGrpSpPr/>
+        <p:nvPr/>
+      </p:nvGrpSpPr>
+      <p:grpSpPr>
+        <a:xfrm>
+          <a:off x="0" y="0"/>
+          <a:ext cx="0" cy="0"/>
+          <a:chOff x="0" y="0"/>
+          <a:chExt cx="0" cy="0"/>
+        </a:xfrm>
+      </p:grpSpPr>
+      <p:sp>
+        <p:nvSpPr>
+          <p:cNvPr id="2" name="Title 1">
+            <a:extLst>
+              <a:ext uri="{FF2B5EF4-FFF2-40B4-BE49-F238E27FC236}">
                 <a16:creationId xmlns:a16="http://schemas.microsoft.com/office/drawing/2014/main" id="{F6246C08-2BB5-3446-8268-0CDF8858ECDB}"/>
               </a:ext>
             </a:extLst>
@@ -3461,7 +3410,7 @@
           <a:p>
             <a:r>
               <a:rPr lang="en-NL" dirty="0"/>
-              <a:t>Cross-check: can we overfit?</a:t>
+              <a:t>Sanity check: can we overfit?</a:t>
             </a:r>
           </a:p>
         </p:txBody>
@@ -3490,7 +3439,7 @@
         </p:blipFill>
         <p:spPr>
           <a:xfrm>
-            <a:off x="651711" y="1485467"/>
+            <a:off x="565214" y="1690688"/>
             <a:ext cx="6663488" cy="5001230"/>
           </a:xfrm>
         </p:spPr>
@@ -3510,7 +3459,7 @@
         <p:spPr>
           <a:xfrm>
             <a:off x="7228702" y="2349365"/>
-            <a:ext cx="4359399" cy="1477328"/>
+            <a:ext cx="4524508" cy="2585323"/>
           </a:xfrm>
           <a:prstGeom prst="rect">
             <a:avLst/>
@@ -3524,38 +3473,150 @@
           <a:lstStyle/>
           <a:p>
             <a:r>
+              <a:rPr lang="en-NL" b="1" dirty="0"/>
+              <a:t>Settings</a:t>
+            </a:r>
+          </a:p>
+          <a:p>
+            <a:endParaRPr lang="en-NL" b="1" dirty="0"/>
+          </a:p>
+          <a:p>
+            <a:pPr marL="285750" indent="-285750">
+              <a:buFont typeface="Arial" panose="020B0604020202020204" pitchFamily="34" charset="0"/>
+              <a:buChar char="•"/>
+            </a:pPr>
+            <a:r>
               <a:rPr lang="en-NL" dirty="0"/>
-              <a:t>Settings:</a:t>
-            </a:r>
-          </a:p>
-          <a:p>
+              <a:t>{2, 70, 70, 1} with Tanh activation functions</a:t>
+            </a:r>
+          </a:p>
+          <a:p>
+            <a:pPr marL="285750" indent="-285750">
+              <a:buFont typeface="Arial" panose="020B0604020202020204" pitchFamily="34" charset="0"/>
+              <a:buChar char="•"/>
+            </a:pPr>
+            <a:endParaRPr lang="en-NL" dirty="0"/>
+          </a:p>
+          <a:p>
+            <a:pPr marL="285750" indent="-285750">
+              <a:buFont typeface="Arial" panose="020B0604020202020204" pitchFamily="34" charset="0"/>
+              <a:buChar char="•"/>
+            </a:pPr>
             <a:r>
               <a:rPr lang="en-NL" dirty="0"/>
-              <a:t>- {2, 70, 70, 1} with Tanh activation functions</a:t>
+              <a:t>100 events per MC set</a:t>
             </a:r>
           </a:p>
           <a:p>
             <a:pPr marL="285750" indent="-285750">
-              <a:buFontTx/>
-              <a:buChar char="-"/>
+              <a:buFont typeface="Arial" panose="020B0604020202020204" pitchFamily="34" charset="0"/>
+              <a:buChar char="•"/>
             </a:pPr>
+            <a:endParaRPr lang="en-NL" dirty="0"/>
+          </a:p>
+          <a:p>
+            <a:pPr marL="285750" indent="-285750">
+              <a:buFont typeface="Arial" panose="020B0604020202020204" pitchFamily="34" charset="0"/>
+              <a:buChar char="•"/>
+            </a:pPr>
             <a:r>
               <a:rPr lang="en-NL" dirty="0"/>
-              <a:t>80 events per set in training</a:t>
+              <a:t>80/20 % training/validation</a:t>
             </a:r>
           </a:p>
           <a:p>
             <a:pPr marL="285750" indent="-285750">
-              <a:buFontTx/>
-              <a:buChar char="-"/>
+              <a:buFont typeface="Arial" panose="020B0604020202020204" pitchFamily="34" charset="0"/>
+              <a:buChar char="•"/>
             </a:pPr>
+            <a:endParaRPr lang="en-NL" dirty="0"/>
+          </a:p>
+          <a:p>
+            <a:pPr marL="285750" indent="-285750">
+              <a:buFont typeface="Arial" panose="020B0604020202020204" pitchFamily="34" charset="0"/>
+              <a:buChar char="•"/>
+            </a:pPr>
             <a:r>
               <a:rPr lang="en-NL" dirty="0"/>
-              <a:t>20 events per set in validation</a:t>
-            </a:r>
-          </a:p>
-          <a:p>
+              <a:t>Adam optimizer with learning rate 1e-3</a:t>
+            </a:r>
+          </a:p>
+        </p:txBody>
+      </p:sp>
+      <p:sp>
+        <p:nvSpPr>
+          <p:cNvPr id="7" name="TextBox 6">
+            <a:extLst>
+              <a:ext uri="{FF2B5EF4-FFF2-40B4-BE49-F238E27FC236}">
+                <a16:creationId xmlns:a16="http://schemas.microsoft.com/office/drawing/2014/main" id="{46CAB739-06F0-CF48-A26E-1EFBC0495672}"/>
+              </a:ext>
+            </a:extLst>
+          </p:cNvPr>
+          <p:cNvSpPr txBox="1"/>
+          <p:nvPr/>
+        </p:nvSpPr>
+        <p:spPr>
+          <a:xfrm>
+            <a:off x="1198605" y="1508478"/>
+            <a:ext cx="10358413" cy="646331"/>
+          </a:xfrm>
+          <a:prstGeom prst="rect">
+            <a:avLst/>
+          </a:prstGeom>
+          <a:noFill/>
+        </p:spPr>
+        <p:txBody>
+          <a:bodyPr wrap="none" rtlCol="0">
+            <a:spAutoFit/>
+          </a:bodyPr>
+          <a:lstStyle/>
+          <a:p>
+            <a:r>
+              <a:rPr lang="en-NL" dirty="0"/>
+              <a:t>If we use an extremely flexible architecture and a small training set, we should be able to overfit quickly, else</a:t>
+            </a:r>
+          </a:p>
+          <a:p>
+            <a:r>
+              <a:rPr lang="en-GB" dirty="0"/>
+              <a:t>the code contains a bug.</a:t>
+            </a:r>
             <a:endParaRPr lang="en-NL" dirty="0"/>
+          </a:p>
+        </p:txBody>
+      </p:sp>
+      <p:sp>
+        <p:nvSpPr>
+          <p:cNvPr id="8" name="TextBox 7">
+            <a:extLst>
+              <a:ext uri="{FF2B5EF4-FFF2-40B4-BE49-F238E27FC236}">
+                <a16:creationId xmlns:a16="http://schemas.microsoft.com/office/drawing/2014/main" id="{3F0C8669-52DF-F34D-8974-EAA0C33C2D65}"/>
+              </a:ext>
+            </a:extLst>
+          </p:cNvPr>
+          <p:cNvSpPr txBox="1"/>
+          <p:nvPr/>
+        </p:nvSpPr>
+        <p:spPr>
+          <a:xfrm>
+            <a:off x="7351820" y="5490137"/>
+            <a:ext cx="4082080" cy="369332"/>
+          </a:xfrm>
+          <a:prstGeom prst="rect">
+            <a:avLst/>
+          </a:prstGeom>
+          <a:noFill/>
+        </p:spPr>
+        <p:txBody>
+          <a:bodyPr wrap="none" rtlCol="0">
+            <a:spAutoFit/>
+          </a:bodyPr>
+          <a:lstStyle/>
+          <a:p>
+            <a:r>
+              <a:rPr lang="en-NL" dirty="0"/>
+              <a:t>Recall: loss is proportional to sample size!</a:t>
+            </a:r>
           </a:p>
         </p:txBody>
       </p:sp>
@@ -3572,10 +3633,608 @@
 </p:sld>
 </file>
 
+<file path=ppt/slides/slide6.xml><?xml version="1.0" encoding="utf-8"?>
+<p:sld xmlns:a="http://schemas.openxmlformats.org/drawingml/2006/main" xmlns:r="http://schemas.openxmlformats.org/officeDocument/2006/relationships" xmlns:p="http://schemas.openxmlformats.org/presentationml/2006/main">
+  <p:cSld>
+    <p:spTree>
+      <p:nvGrpSpPr>
+        <p:cNvPr id="1" name=""/>
+        <p:cNvGrpSpPr/>
+        <p:nvPr/>
+      </p:nvGrpSpPr>
+      <p:grpSpPr>
+        <a:xfrm>
+          <a:off x="0" y="0"/>
+          <a:ext cx="0" cy="0"/>
+          <a:chOff x="0" y="0"/>
+          <a:chExt cx="0" cy="0"/>
+        </a:xfrm>
+      </p:grpSpPr>
+      <p:pic>
+        <p:nvPicPr>
+          <p:cNvPr id="5" name="Content Placeholder 4">
+            <a:extLst>
+              <a:ext uri="{FF2B5EF4-FFF2-40B4-BE49-F238E27FC236}">
+                <a16:creationId xmlns:a16="http://schemas.microsoft.com/office/drawing/2014/main" id="{A7A61AD9-EEA0-5B4D-9A31-83A9A84E823B}"/>
+              </a:ext>
+            </a:extLst>
+          </p:cNvPr>
+          <p:cNvPicPr>
+            <a:picLocks noGrp="1" noChangeAspect="1"/>
+          </p:cNvPicPr>
+          <p:nvPr>
+            <p:ph idx="1"/>
+          </p:nvPr>
+        </p:nvPicPr>
+        <p:blipFill rotWithShape="1">
+          <a:blip r:embed="rId2"/>
+          <a:srcRect l="5241" r="9088"/>
+          <a:stretch/>
+        </p:blipFill>
+        <p:spPr>
+          <a:xfrm>
+            <a:off x="441736" y="1167632"/>
+            <a:ext cx="5857103" cy="5131229"/>
+          </a:xfrm>
+        </p:spPr>
+      </p:pic>
+      <p:sp>
+        <p:nvSpPr>
+          <p:cNvPr id="7" name="TextBox 6">
+            <a:extLst>
+              <a:ext uri="{FF2B5EF4-FFF2-40B4-BE49-F238E27FC236}">
+                <a16:creationId xmlns:a16="http://schemas.microsoft.com/office/drawing/2014/main" id="{7BD70C80-B77D-3643-96F4-6F1FC925AB11}"/>
+              </a:ext>
+            </a:extLst>
+          </p:cNvPr>
+          <p:cNvSpPr txBox="1"/>
+          <p:nvPr/>
+        </p:nvSpPr>
+        <p:spPr>
+          <a:xfrm>
+            <a:off x="1939048" y="6298861"/>
+            <a:ext cx="2359813" cy="369332"/>
+          </a:xfrm>
+          <a:prstGeom prst="rect">
+            <a:avLst/>
+          </a:prstGeom>
+          <a:noFill/>
+        </p:spPr>
+        <p:txBody>
+          <a:bodyPr wrap="none" rtlCol="0">
+            <a:spAutoFit/>
+          </a:bodyPr>
+          <a:lstStyle/>
+          <a:p>
+            <a:r>
+              <a:rPr lang="en-NL" dirty="0"/>
+              <a:t>Training set (40 events)</a:t>
+            </a:r>
+          </a:p>
+        </p:txBody>
+      </p:sp>
+      <p:pic>
+        <p:nvPicPr>
+          <p:cNvPr id="9" name="Picture 8">
+            <a:extLst>
+              <a:ext uri="{FF2B5EF4-FFF2-40B4-BE49-F238E27FC236}">
+                <a16:creationId xmlns:a16="http://schemas.microsoft.com/office/drawing/2014/main" id="{8BC48CEE-93F6-1E4C-93B9-BB599185F545}"/>
+              </a:ext>
+            </a:extLst>
+          </p:cNvPr>
+          <p:cNvPicPr>
+            <a:picLocks noChangeAspect="1"/>
+          </p:cNvPicPr>
+          <p:nvPr/>
+        </p:nvPicPr>
+        <p:blipFill rotWithShape="1">
+          <a:blip r:embed="rId3"/>
+          <a:srcRect l="4767" r="10174"/>
+          <a:stretch/>
+        </p:blipFill>
+        <p:spPr>
+          <a:xfrm>
+            <a:off x="6199643" y="1098875"/>
+            <a:ext cx="5893159" cy="5199986"/>
+          </a:xfrm>
+          <a:prstGeom prst="rect">
+            <a:avLst/>
+          </a:prstGeom>
+        </p:spPr>
+      </p:pic>
+      <p:sp>
+        <p:nvSpPr>
+          <p:cNvPr id="12" name="TextBox 11">
+            <a:extLst>
+              <a:ext uri="{FF2B5EF4-FFF2-40B4-BE49-F238E27FC236}">
+                <a16:creationId xmlns:a16="http://schemas.microsoft.com/office/drawing/2014/main" id="{A8F394BE-E4D9-6E45-A0C3-12EB7A3D9E2B}"/>
+              </a:ext>
+            </a:extLst>
+          </p:cNvPr>
+          <p:cNvSpPr txBox="1"/>
+          <p:nvPr/>
+        </p:nvSpPr>
+        <p:spPr>
+          <a:xfrm>
+            <a:off x="8090848" y="6274657"/>
+            <a:ext cx="2556277" cy="369332"/>
+          </a:xfrm>
+          <a:prstGeom prst="rect">
+            <a:avLst/>
+          </a:prstGeom>
+          <a:noFill/>
+        </p:spPr>
+        <p:txBody>
+          <a:bodyPr wrap="none" rtlCol="0">
+            <a:spAutoFit/>
+          </a:bodyPr>
+          <a:lstStyle/>
+          <a:p>
+            <a:r>
+              <a:rPr lang="en-NL" dirty="0"/>
+              <a:t>Validation set (10 events)</a:t>
+            </a:r>
+          </a:p>
+        </p:txBody>
+      </p:sp>
+      <p:pic>
+        <p:nvPicPr>
+          <p:cNvPr id="13" name="Picture 12">
+            <a:extLst>
+              <a:ext uri="{FF2B5EF4-FFF2-40B4-BE49-F238E27FC236}">
+                <a16:creationId xmlns:a16="http://schemas.microsoft.com/office/drawing/2014/main" id="{F6566493-57DC-874E-B5A2-EAB3D028C28A}"/>
+              </a:ext>
+            </a:extLst>
+          </p:cNvPr>
+          <p:cNvPicPr>
+            <a:picLocks noChangeAspect="1"/>
+          </p:cNvPicPr>
+          <p:nvPr/>
+        </p:nvPicPr>
+        <p:blipFill>
+          <a:blip r:embed="rId4"/>
+          <a:stretch>
+            <a:fillRect/>
+          </a:stretch>
+        </p:blipFill>
+        <p:spPr>
+          <a:xfrm>
+            <a:off x="5232383" y="289104"/>
+            <a:ext cx="6654800" cy="1066800"/>
+          </a:xfrm>
+          <a:prstGeom prst="rect">
+            <a:avLst/>
+          </a:prstGeom>
+          <a:solidFill>
+            <a:srgbClr val="FFFFFF">
+              <a:shade val="85000"/>
+            </a:srgbClr>
+          </a:solidFill>
+          <a:ln w="88900" cap="sq">
+            <a:solidFill>
+              <a:srgbClr val="FFFFFF"/>
+            </a:solidFill>
+            <a:miter lim="800000"/>
+          </a:ln>
+          <a:effectLst>
+            <a:outerShdw blurRad="55000" dist="18000" dir="5400000" algn="tl" rotWithShape="0">
+              <a:srgbClr val="000000">
+                <a:alpha val="40000"/>
+              </a:srgbClr>
+            </a:outerShdw>
+          </a:effectLst>
+          <a:scene3d>
+            <a:camera prst="orthographicFront"/>
+            <a:lightRig rig="twoPt" dir="t">
+              <a:rot lat="0" lon="0" rev="7200000"/>
+            </a:lightRig>
+          </a:scene3d>
+          <a:sp3d>
+            <a:bevelT w="25400" h="19050"/>
+            <a:contourClr>
+              <a:srgbClr val="FFFFFF"/>
+            </a:contourClr>
+          </a:sp3d>
+        </p:spPr>
+      </p:pic>
+      <p:sp>
+        <p:nvSpPr>
+          <p:cNvPr id="14" name="TextBox 13">
+            <a:extLst>
+              <a:ext uri="{FF2B5EF4-FFF2-40B4-BE49-F238E27FC236}">
+                <a16:creationId xmlns:a16="http://schemas.microsoft.com/office/drawing/2014/main" id="{6D4C72C0-0673-9842-9D3D-59EDD4A2C6FC}"/>
+              </a:ext>
+            </a:extLst>
+          </p:cNvPr>
+          <p:cNvSpPr txBox="1"/>
+          <p:nvPr/>
+        </p:nvSpPr>
+        <p:spPr>
+          <a:xfrm>
+            <a:off x="1093857" y="637210"/>
+            <a:ext cx="3013004" cy="461665"/>
+          </a:xfrm>
+          <a:prstGeom prst="rect">
+            <a:avLst/>
+          </a:prstGeom>
+          <a:noFill/>
+        </p:spPr>
+        <p:txBody>
+          <a:bodyPr wrap="none" rtlCol="0">
+            <a:spAutoFit/>
+          </a:bodyPr>
+          <a:lstStyle/>
+          <a:p>
+            <a:r>
+              <a:rPr lang="en-NL" sz="2400" b="1" dirty="0"/>
+              <a:t>Example of overfitting</a:t>
+            </a:r>
+          </a:p>
+        </p:txBody>
+      </p:sp>
+    </p:spTree>
+    <p:extLst>
+      <p:ext uri="{BB962C8B-B14F-4D97-AF65-F5344CB8AC3E}">
+        <p14:creationId xmlns:p14="http://schemas.microsoft.com/office/powerpoint/2010/main" val="3366314467"/>
+      </p:ext>
+    </p:extLst>
+  </p:cSld>
+  <p:clrMapOvr>
+    <a:masterClrMapping/>
+  </p:clrMapOvr>
+</p:sld>
+</file>
+
+<file path=ppt/slides/slide7.xml><?xml version="1.0" encoding="utf-8"?>
+<p:sld xmlns:a="http://schemas.openxmlformats.org/drawingml/2006/main" xmlns:r="http://schemas.openxmlformats.org/officeDocument/2006/relationships" xmlns:p="http://schemas.openxmlformats.org/presentationml/2006/main">
+  <p:cSld>
+    <p:spTree>
+      <p:nvGrpSpPr>
+        <p:cNvPr id="1" name=""/>
+        <p:cNvGrpSpPr/>
+        <p:nvPr/>
+      </p:nvGrpSpPr>
+      <p:grpSpPr>
+        <a:xfrm>
+          <a:off x="0" y="0"/>
+          <a:ext cx="0" cy="0"/>
+          <a:chOff x="0" y="0"/>
+          <a:chExt cx="0" cy="0"/>
+        </a:xfrm>
+      </p:grpSpPr>
+      <p:pic>
+        <p:nvPicPr>
+          <p:cNvPr id="5" name="Content Placeholder 4">
+            <a:extLst>
+              <a:ext uri="{FF2B5EF4-FFF2-40B4-BE49-F238E27FC236}">
+                <a16:creationId xmlns:a16="http://schemas.microsoft.com/office/drawing/2014/main" id="{9A3071F0-CE6E-444A-97CC-151C00061265}"/>
+              </a:ext>
+            </a:extLst>
+          </p:cNvPr>
+          <p:cNvPicPr>
+            <a:picLocks noGrp="1" noChangeAspect="1"/>
+          </p:cNvPicPr>
+          <p:nvPr>
+            <p:ph idx="1"/>
+          </p:nvPr>
+        </p:nvPicPr>
+        <p:blipFill rotWithShape="1">
+          <a:blip r:embed="rId2"/>
+          <a:srcRect l="5539" r="9788"/>
+          <a:stretch/>
+        </p:blipFill>
+        <p:spPr>
+          <a:xfrm>
+            <a:off x="6273852" y="1336448"/>
+            <a:ext cx="5287743" cy="4687043"/>
+          </a:xfrm>
+        </p:spPr>
+      </p:pic>
+      <p:sp>
+        <p:nvSpPr>
+          <p:cNvPr id="6" name="TextBox 5">
+            <a:extLst>
+              <a:ext uri="{FF2B5EF4-FFF2-40B4-BE49-F238E27FC236}">
+                <a16:creationId xmlns:a16="http://schemas.microsoft.com/office/drawing/2014/main" id="{D2B65F83-642A-7049-A43A-4C22F245A186}"/>
+              </a:ext>
+            </a:extLst>
+          </p:cNvPr>
+          <p:cNvSpPr txBox="1"/>
+          <p:nvPr/>
+        </p:nvSpPr>
+        <p:spPr>
+          <a:xfrm>
+            <a:off x="7675795" y="6148257"/>
+            <a:ext cx="2439257" cy="369332"/>
+          </a:xfrm>
+          <a:prstGeom prst="rect">
+            <a:avLst/>
+          </a:prstGeom>
+          <a:noFill/>
+        </p:spPr>
+        <p:txBody>
+          <a:bodyPr wrap="none" rtlCol="0">
+            <a:spAutoFit/>
+          </a:bodyPr>
+          <a:lstStyle/>
+          <a:p>
+            <a:r>
+              <a:rPr lang="en-NL" dirty="0"/>
+              <a:t>Validation set (2 events)</a:t>
+            </a:r>
+          </a:p>
+        </p:txBody>
+      </p:sp>
+      <p:pic>
+        <p:nvPicPr>
+          <p:cNvPr id="11" name="Picture 10">
+            <a:extLst>
+              <a:ext uri="{FF2B5EF4-FFF2-40B4-BE49-F238E27FC236}">
+                <a16:creationId xmlns:a16="http://schemas.microsoft.com/office/drawing/2014/main" id="{D837780B-1ADD-0948-A807-F8E670198C5A}"/>
+              </a:ext>
+            </a:extLst>
+          </p:cNvPr>
+          <p:cNvPicPr>
+            <a:picLocks noChangeAspect="1"/>
+          </p:cNvPicPr>
+          <p:nvPr/>
+        </p:nvPicPr>
+        <p:blipFill rotWithShape="1">
+          <a:blip r:embed="rId3"/>
+          <a:srcRect l="4517" r="11636"/>
+          <a:stretch/>
+        </p:blipFill>
+        <p:spPr>
+          <a:xfrm>
+            <a:off x="665206" y="1336448"/>
+            <a:ext cx="5340178" cy="4780147"/>
+          </a:xfrm>
+          <a:prstGeom prst="rect">
+            <a:avLst/>
+          </a:prstGeom>
+        </p:spPr>
+      </p:pic>
+      <p:sp>
+        <p:nvSpPr>
+          <p:cNvPr id="15" name="TextBox 14">
+            <a:extLst>
+              <a:ext uri="{FF2B5EF4-FFF2-40B4-BE49-F238E27FC236}">
+                <a16:creationId xmlns:a16="http://schemas.microsoft.com/office/drawing/2014/main" id="{A252F3D8-EA4F-CF46-9EC3-503A6A85A102}"/>
+              </a:ext>
+            </a:extLst>
+          </p:cNvPr>
+          <p:cNvSpPr txBox="1"/>
+          <p:nvPr/>
+        </p:nvSpPr>
+        <p:spPr>
+          <a:xfrm>
+            <a:off x="1093857" y="637210"/>
+            <a:ext cx="3964483" cy="461665"/>
+          </a:xfrm>
+          <a:prstGeom prst="rect">
+            <a:avLst/>
+          </a:prstGeom>
+          <a:noFill/>
+        </p:spPr>
+        <p:txBody>
+          <a:bodyPr wrap="none" rtlCol="0">
+            <a:spAutoFit/>
+          </a:bodyPr>
+          <a:lstStyle/>
+          <a:p>
+            <a:r>
+              <a:rPr lang="en-NL" sz="2400" b="1" dirty="0"/>
+              <a:t>An even more extreme check</a:t>
+            </a:r>
+          </a:p>
+        </p:txBody>
+      </p:sp>
+      <p:sp>
+        <p:nvSpPr>
+          <p:cNvPr id="16" name="TextBox 15">
+            <a:extLst>
+              <a:ext uri="{FF2B5EF4-FFF2-40B4-BE49-F238E27FC236}">
+                <a16:creationId xmlns:a16="http://schemas.microsoft.com/office/drawing/2014/main" id="{3C6D97B4-8058-0E4C-83E3-AB7750405E6F}"/>
+              </a:ext>
+            </a:extLst>
+          </p:cNvPr>
+          <p:cNvSpPr txBox="1"/>
+          <p:nvPr/>
+        </p:nvSpPr>
+        <p:spPr>
+          <a:xfrm>
+            <a:off x="1939806" y="6166621"/>
+            <a:ext cx="2242793" cy="369332"/>
+          </a:xfrm>
+          <a:prstGeom prst="rect">
+            <a:avLst/>
+          </a:prstGeom>
+          <a:noFill/>
+        </p:spPr>
+        <p:txBody>
+          <a:bodyPr wrap="none" rtlCol="0">
+            <a:spAutoFit/>
+          </a:bodyPr>
+          <a:lstStyle/>
+          <a:p>
+            <a:r>
+              <a:rPr lang="en-NL" dirty="0"/>
+              <a:t>Training set (8 events)</a:t>
+            </a:r>
+          </a:p>
+        </p:txBody>
+      </p:sp>
+      <p:sp>
+        <p:nvSpPr>
+          <p:cNvPr id="17" name="TextBox 16">
+            <a:extLst>
+              <a:ext uri="{FF2B5EF4-FFF2-40B4-BE49-F238E27FC236}">
+                <a16:creationId xmlns:a16="http://schemas.microsoft.com/office/drawing/2014/main" id="{D7C2999A-FB9D-3C48-A353-F07B0AA6ABCA}"/>
+              </a:ext>
+            </a:extLst>
+          </p:cNvPr>
+          <p:cNvSpPr txBox="1"/>
+          <p:nvPr/>
+        </p:nvSpPr>
+        <p:spPr>
+          <a:xfrm>
+            <a:off x="1276865" y="1163176"/>
+            <a:ext cx="4509183" cy="369332"/>
+          </a:xfrm>
+          <a:prstGeom prst="rect">
+            <a:avLst/>
+          </a:prstGeom>
+          <a:noFill/>
+        </p:spPr>
+        <p:txBody>
+          <a:bodyPr wrap="none" rtlCol="0">
+            <a:spAutoFit/>
+          </a:bodyPr>
+          <a:lstStyle/>
+          <a:p>
+            <a:r>
+              <a:rPr lang="en-NL" dirty="0"/>
+              <a:t>Notice how the SM points get mapped to f = 1</a:t>
+            </a:r>
+          </a:p>
+        </p:txBody>
+      </p:sp>
+      <p:sp>
+        <p:nvSpPr>
+          <p:cNvPr id="18" name="TextBox 17">
+            <a:extLst>
+              <a:ext uri="{FF2B5EF4-FFF2-40B4-BE49-F238E27FC236}">
+                <a16:creationId xmlns:a16="http://schemas.microsoft.com/office/drawing/2014/main" id="{A79F175A-9AD8-724B-9781-2EB9F655BE4D}"/>
+              </a:ext>
+            </a:extLst>
+          </p:cNvPr>
+          <p:cNvSpPr txBox="1"/>
+          <p:nvPr/>
+        </p:nvSpPr>
+        <p:spPr>
+          <a:xfrm>
+            <a:off x="6913606" y="1163176"/>
+            <a:ext cx="3874459" cy="369332"/>
+          </a:xfrm>
+          <a:prstGeom prst="rect">
+            <a:avLst/>
+          </a:prstGeom>
+          <a:noFill/>
+        </p:spPr>
+        <p:txBody>
+          <a:bodyPr wrap="none" rtlCol="0">
+            <a:spAutoFit/>
+          </a:bodyPr>
+          <a:lstStyle/>
+          <a:p>
+            <a:r>
+              <a:rPr lang="en-GB" dirty="0"/>
+              <a:t>… which is not true in the validation set</a:t>
+            </a:r>
+            <a:endParaRPr lang="en-NL" dirty="0"/>
+          </a:p>
+        </p:txBody>
+      </p:sp>
+    </p:spTree>
+    <p:extLst>
+      <p:ext uri="{BB962C8B-B14F-4D97-AF65-F5344CB8AC3E}">
+        <p14:creationId xmlns:p14="http://schemas.microsoft.com/office/powerpoint/2010/main" val="2774092486"/>
+      </p:ext>
+    </p:extLst>
+  </p:cSld>
+  <p:clrMapOvr>
+    <a:masterClrMapping/>
+  </p:clrMapOvr>
+</p:sld>
+</file>
+
+<file path=ppt/slides/slide8.xml><?xml version="1.0" encoding="utf-8"?>
+<p:sld xmlns:a="http://schemas.openxmlformats.org/drawingml/2006/main" xmlns:r="http://schemas.openxmlformats.org/officeDocument/2006/relationships" xmlns:p="http://schemas.openxmlformats.org/presentationml/2006/main">
+  <p:cSld>
+    <p:spTree>
+      <p:nvGrpSpPr>
+        <p:cNvPr id="1" name=""/>
+        <p:cNvGrpSpPr/>
+        <p:nvPr/>
+      </p:nvGrpSpPr>
+      <p:grpSpPr>
+        <a:xfrm>
+          <a:off x="0" y="0"/>
+          <a:ext cx="0" cy="0"/>
+          <a:chOff x="0" y="0"/>
+          <a:chExt cx="0" cy="0"/>
+        </a:xfrm>
+      </p:grpSpPr>
+      <p:sp>
+        <p:nvSpPr>
+          <p:cNvPr id="2" name="Title 1">
+            <a:extLst>
+              <a:ext uri="{FF2B5EF4-FFF2-40B4-BE49-F238E27FC236}">
+                <a16:creationId xmlns:a16="http://schemas.microsoft.com/office/drawing/2014/main" id="{B00D0093-22FF-F34A-AE9B-5D7D3124EB87}"/>
+              </a:ext>
+            </a:extLst>
+          </p:cNvPr>
+          <p:cNvSpPr>
+            <a:spLocks noGrp="1"/>
+          </p:cNvSpPr>
+          <p:nvPr>
+            <p:ph type="title"/>
+          </p:nvPr>
+        </p:nvSpPr>
+        <p:spPr/>
+        <p:txBody>
+          <a:bodyPr/>
+          <a:lstStyle/>
+          <a:p>
+            <a:r>
+              <a:rPr lang="en-NL" dirty="0"/>
+              <a:t>Point by point comparison</a:t>
+            </a:r>
+          </a:p>
+        </p:txBody>
+      </p:sp>
+      <p:sp>
+        <p:nvSpPr>
+          <p:cNvPr id="3" name="Content Placeholder 2">
+            <a:extLst>
+              <a:ext uri="{FF2B5EF4-FFF2-40B4-BE49-F238E27FC236}">
+                <a16:creationId xmlns:a16="http://schemas.microsoft.com/office/drawing/2014/main" id="{03323ADF-A8C8-554C-A277-D2693981E5EE}"/>
+              </a:ext>
+            </a:extLst>
+          </p:cNvPr>
+          <p:cNvSpPr>
+            <a:spLocks noGrp="1"/>
+          </p:cNvSpPr>
+          <p:nvPr>
+            <p:ph idx="1"/>
+          </p:nvPr>
+        </p:nvSpPr>
+        <p:spPr/>
+        <p:txBody>
+          <a:bodyPr/>
+          <a:lstStyle/>
+          <a:p>
+            <a:endParaRPr lang="en-NL"/>
+          </a:p>
+        </p:txBody>
+      </p:sp>
+    </p:spTree>
+    <p:extLst>
+      <p:ext uri="{BB962C8B-B14F-4D97-AF65-F5344CB8AC3E}">
+        <p14:creationId xmlns:p14="http://schemas.microsoft.com/office/powerpoint/2010/main" val="3427568213"/>
+      </p:ext>
+    </p:extLst>
+  </p:cSld>
+  <p:clrMapOvr>
+    <a:masterClrMapping/>
+  </p:clrMapOvr>
+</p:sld>
+</file>
+
 <file path=ppt/theme/theme1.xml><?xml version="1.0" encoding="utf-8"?>
 <a:theme xmlns:a="http://schemas.openxmlformats.org/drawingml/2006/main" name="Office Theme">
   <a:themeElements>
-    <a:clrScheme name="Office">
+    <a:clrScheme name="Office Theme">
       <a:dk1>
         <a:sysClr val="windowText" lastClr="000000"/>
       </a:dk1>
@@ -3613,7 +4272,7 @@
         <a:srgbClr val="954F72"/>
       </a:folHlink>
     </a:clrScheme>
-    <a:fontScheme name="Office">
+    <a:fontScheme name="Office Theme">
       <a:majorFont>
         <a:latin typeface="Calibri Light" panose="020F0302020204030204"/>
         <a:ea typeface=""/>
@@ -3648,23 +4307,6 @@
         <a:font script="Viet" typeface="Times New Roman"/>
         <a:font script="Uigh" typeface="Microsoft Uighur"/>
         <a:font script="Geor" typeface="Sylfaen"/>
-        <a:font script="Armn" typeface="Arial"/>
-        <a:font script="Bugi" typeface="Leelawadee UI"/>
-        <a:font script="Bopo" typeface="Microsoft JhengHei"/>
-        <a:font script="Java" typeface="Javanese Text"/>
-        <a:font script="Lisu" typeface="Segoe UI"/>
-        <a:font script="Mymr" typeface="Myanmar Text"/>
-        <a:font script="Nkoo" typeface="Ebrima"/>
-        <a:font script="Olck" typeface="Nirmala UI"/>
-        <a:font script="Osma" typeface="Ebrima"/>
-        <a:font script="Phag" typeface="Phagspa"/>
-        <a:font script="Syrn" typeface="Estrangelo Edessa"/>
-        <a:font script="Syrj" typeface="Estrangelo Edessa"/>
-        <a:font script="Syre" typeface="Estrangelo Edessa"/>
-        <a:font script="Sora" typeface="Nirmala UI"/>
-        <a:font script="Tale" typeface="Microsoft Tai Le"/>
-        <a:font script="Talu" typeface="Microsoft New Tai Lue"/>
-        <a:font script="Tfng" typeface="Ebrima"/>
       </a:majorFont>
       <a:minorFont>
         <a:latin typeface="Calibri" panose="020F0502020204030204"/>
@@ -3700,26 +4342,9 @@
         <a:font script="Viet" typeface="Arial"/>
         <a:font script="Uigh" typeface="Microsoft Uighur"/>
         <a:font script="Geor" typeface="Sylfaen"/>
-        <a:font script="Armn" typeface="Arial"/>
-        <a:font script="Bugi" typeface="Leelawadee UI"/>
-        <a:font script="Bopo" typeface="Microsoft JhengHei"/>
-        <a:font script="Java" typeface="Javanese Text"/>
-        <a:font script="Lisu" typeface="Segoe UI"/>
-        <a:font script="Mymr" typeface="Myanmar Text"/>
-        <a:font script="Nkoo" typeface="Ebrima"/>
-        <a:font script="Olck" typeface="Nirmala UI"/>
-        <a:font script="Osma" typeface="Ebrima"/>
-        <a:font script="Phag" typeface="Phagspa"/>
-        <a:font script="Syrn" typeface="Estrangelo Edessa"/>
-        <a:font script="Syrj" typeface="Estrangelo Edessa"/>
-        <a:font script="Syre" typeface="Estrangelo Edessa"/>
-        <a:font script="Sora" typeface="Nirmala UI"/>
-        <a:font script="Tale" typeface="Microsoft Tai Le"/>
-        <a:font script="Talu" typeface="Microsoft New Tai Lue"/>
-        <a:font script="Tfng" typeface="Ebrima"/>
       </a:minorFont>
     </a:fontScheme>
-    <a:fmtScheme name="Office">
+    <a:fmtScheme name="Office Theme">
       <a:fillStyleLst>
         <a:solidFill>
           <a:schemeClr val="phClr"/>

</xml_diff>